<commit_message>
Added Glossary, changed some pptx stuff, and created a file
</commit_message>
<xml_diff>
--- a/docs/CSHARE.pptx
+++ b/docs/CSHARE.pptx
@@ -10,14 +10,14 @@
   <p:sldIdLst>
     <p:sldId id="256" r:id="rId2"/>
     <p:sldId id="257" r:id="rId3"/>
-    <p:sldId id="260" r:id="rId4"/>
-    <p:sldId id="261" r:id="rId5"/>
-    <p:sldId id="262" r:id="rId6"/>
-    <p:sldId id="259" r:id="rId7"/>
-    <p:sldId id="264" r:id="rId8"/>
-    <p:sldId id="265" r:id="rId9"/>
-    <p:sldId id="267" r:id="rId10"/>
-    <p:sldId id="268" r:id="rId11"/>
+    <p:sldId id="261" r:id="rId4"/>
+    <p:sldId id="260" r:id="rId5"/>
+    <p:sldId id="259" r:id="rId6"/>
+    <p:sldId id="264" r:id="rId7"/>
+    <p:sldId id="265" r:id="rId8"/>
+    <p:sldId id="267" r:id="rId9"/>
+    <p:sldId id="268" r:id="rId10"/>
+    <p:sldId id="262" r:id="rId11"/>
     <p:sldId id="263" r:id="rId12"/>
   </p:sldIdLst>
   <p:sldSz cx="12192000" cy="6858000"/>
@@ -539,6 +539,15 @@
               <a:t>/</a:t>
             </a:r>
           </a:p>
+          <a:p>
+            <a:endParaRPr lang="en-US" dirty="0"/>
+          </a:p>
+          <a:p>
+            <a:r>
+              <a:rPr lang="en-US" dirty="0"/>
+              <a:t>- Sam </a:t>
+            </a:r>
+          </a:p>
         </p:txBody>
       </p:sp>
       <p:sp>
@@ -568,6 +577,702 @@
     <p:extLst>
       <p:ext uri="{BB962C8B-B14F-4D97-AF65-F5344CB8AC3E}">
         <p14:creationId xmlns:p14="http://schemas.microsoft.com/office/powerpoint/2010/main" val="115597931"/>
+      </p:ext>
+    </p:extLst>
+  </p:cSld>
+  <p:clrMapOvr>
+    <a:masterClrMapping/>
+  </p:clrMapOvr>
+</p:notes>
+</file>
+
+<file path=ppt/notesSlides/notesSlide2.xml><?xml version="1.0" encoding="utf-8"?>
+<p:notes xmlns:a="http://schemas.openxmlformats.org/drawingml/2006/main" xmlns:r="http://schemas.openxmlformats.org/officeDocument/2006/relationships" xmlns:p="http://schemas.openxmlformats.org/presentationml/2006/main">
+  <p:cSld>
+    <p:spTree>
+      <p:nvGrpSpPr>
+        <p:cNvPr id="1" name=""/>
+        <p:cNvGrpSpPr/>
+        <p:nvPr/>
+      </p:nvGrpSpPr>
+      <p:grpSpPr>
+        <a:xfrm>
+          <a:off x="0" y="0"/>
+          <a:ext cx="0" cy="0"/>
+          <a:chOff x="0" y="0"/>
+          <a:chExt cx="0" cy="0"/>
+        </a:xfrm>
+      </p:grpSpPr>
+      <p:sp>
+        <p:nvSpPr>
+          <p:cNvPr id="2" name="Slide Image Placeholder 1"/>
+          <p:cNvSpPr>
+            <a:spLocks noGrp="1" noRot="1" noChangeAspect="1"/>
+          </p:cNvSpPr>
+          <p:nvPr>
+            <p:ph type="sldImg"/>
+          </p:nvPr>
+        </p:nvSpPr>
+        <p:spPr/>
+      </p:sp>
+      <p:sp>
+        <p:nvSpPr>
+          <p:cNvPr id="3" name="Notes Placeholder 2"/>
+          <p:cNvSpPr>
+            <a:spLocks noGrp="1"/>
+          </p:cNvSpPr>
+          <p:nvPr>
+            <p:ph type="body" idx="1"/>
+          </p:nvPr>
+        </p:nvSpPr>
+        <p:spPr/>
+        <p:txBody>
+          <a:bodyPr/>
+          <a:lstStyle/>
+          <a:p>
+            <a:r>
+              <a:rPr lang="en-US" dirty="0"/>
+              <a:t> - Katie</a:t>
+            </a:r>
+          </a:p>
+        </p:txBody>
+      </p:sp>
+      <p:sp>
+        <p:nvSpPr>
+          <p:cNvPr id="4" name="Slide Number Placeholder 3"/>
+          <p:cNvSpPr>
+            <a:spLocks noGrp="1"/>
+          </p:cNvSpPr>
+          <p:nvPr>
+            <p:ph type="sldNum" sz="quarter" idx="5"/>
+          </p:nvPr>
+        </p:nvSpPr>
+        <p:spPr/>
+        <p:txBody>
+          <a:bodyPr/>
+          <a:lstStyle/>
+          <a:p>
+            <a:fld id="{F62386AB-2375-D44E-B5C4-5F502E66C5AB}" type="slidenum">
+              <a:rPr lang="en-US" smtClean="0"/>
+              <a:t>3</a:t>
+            </a:fld>
+            <a:endParaRPr lang="en-US"/>
+          </a:p>
+        </p:txBody>
+      </p:sp>
+    </p:spTree>
+    <p:extLst>
+      <p:ext uri="{BB962C8B-B14F-4D97-AF65-F5344CB8AC3E}">
+        <p14:creationId xmlns:p14="http://schemas.microsoft.com/office/powerpoint/2010/main" val="1964031853"/>
+      </p:ext>
+    </p:extLst>
+  </p:cSld>
+  <p:clrMapOvr>
+    <a:masterClrMapping/>
+  </p:clrMapOvr>
+</p:notes>
+</file>
+
+<file path=ppt/notesSlides/notesSlide3.xml><?xml version="1.0" encoding="utf-8"?>
+<p:notes xmlns:a="http://schemas.openxmlformats.org/drawingml/2006/main" xmlns:r="http://schemas.openxmlformats.org/officeDocument/2006/relationships" xmlns:p="http://schemas.openxmlformats.org/presentationml/2006/main">
+  <p:cSld>
+    <p:spTree>
+      <p:nvGrpSpPr>
+        <p:cNvPr id="1" name=""/>
+        <p:cNvGrpSpPr/>
+        <p:nvPr/>
+      </p:nvGrpSpPr>
+      <p:grpSpPr>
+        <a:xfrm>
+          <a:off x="0" y="0"/>
+          <a:ext cx="0" cy="0"/>
+          <a:chOff x="0" y="0"/>
+          <a:chExt cx="0" cy="0"/>
+        </a:xfrm>
+      </p:grpSpPr>
+      <p:sp>
+        <p:nvSpPr>
+          <p:cNvPr id="2" name="Slide Image Placeholder 1"/>
+          <p:cNvSpPr>
+            <a:spLocks noGrp="1" noRot="1" noChangeAspect="1"/>
+          </p:cNvSpPr>
+          <p:nvPr>
+            <p:ph type="sldImg"/>
+          </p:nvPr>
+        </p:nvSpPr>
+        <p:spPr/>
+      </p:sp>
+      <p:sp>
+        <p:nvSpPr>
+          <p:cNvPr id="3" name="Notes Placeholder 2"/>
+          <p:cNvSpPr>
+            <a:spLocks noGrp="1"/>
+          </p:cNvSpPr>
+          <p:nvPr>
+            <p:ph type="body" idx="1"/>
+          </p:nvPr>
+        </p:nvSpPr>
+        <p:spPr/>
+        <p:txBody>
+          <a:bodyPr/>
+          <a:lstStyle/>
+          <a:p>
+            <a:r>
+              <a:rPr lang="en-US" dirty="0"/>
+              <a:t>- Sam</a:t>
+            </a:r>
+          </a:p>
+        </p:txBody>
+      </p:sp>
+      <p:sp>
+        <p:nvSpPr>
+          <p:cNvPr id="4" name="Slide Number Placeholder 3"/>
+          <p:cNvSpPr>
+            <a:spLocks noGrp="1"/>
+          </p:cNvSpPr>
+          <p:nvPr>
+            <p:ph type="sldNum" sz="quarter" idx="5"/>
+          </p:nvPr>
+        </p:nvSpPr>
+        <p:spPr/>
+        <p:txBody>
+          <a:bodyPr/>
+          <a:lstStyle/>
+          <a:p>
+            <a:fld id="{F62386AB-2375-D44E-B5C4-5F502E66C5AB}" type="slidenum">
+              <a:rPr lang="en-US" smtClean="0"/>
+              <a:t>4</a:t>
+            </a:fld>
+            <a:endParaRPr lang="en-US"/>
+          </a:p>
+        </p:txBody>
+      </p:sp>
+    </p:spTree>
+    <p:extLst>
+      <p:ext uri="{BB962C8B-B14F-4D97-AF65-F5344CB8AC3E}">
+        <p14:creationId xmlns:p14="http://schemas.microsoft.com/office/powerpoint/2010/main" val="3810982734"/>
+      </p:ext>
+    </p:extLst>
+  </p:cSld>
+  <p:clrMapOvr>
+    <a:masterClrMapping/>
+  </p:clrMapOvr>
+</p:notes>
+</file>
+
+<file path=ppt/notesSlides/notesSlide4.xml><?xml version="1.0" encoding="utf-8"?>
+<p:notes xmlns:a="http://schemas.openxmlformats.org/drawingml/2006/main" xmlns:r="http://schemas.openxmlformats.org/officeDocument/2006/relationships" xmlns:p="http://schemas.openxmlformats.org/presentationml/2006/main">
+  <p:cSld>
+    <p:spTree>
+      <p:nvGrpSpPr>
+        <p:cNvPr id="1" name=""/>
+        <p:cNvGrpSpPr/>
+        <p:nvPr/>
+      </p:nvGrpSpPr>
+      <p:grpSpPr>
+        <a:xfrm>
+          <a:off x="0" y="0"/>
+          <a:ext cx="0" cy="0"/>
+          <a:chOff x="0" y="0"/>
+          <a:chExt cx="0" cy="0"/>
+        </a:xfrm>
+      </p:grpSpPr>
+      <p:sp>
+        <p:nvSpPr>
+          <p:cNvPr id="2" name="Slide Image Placeholder 1"/>
+          <p:cNvSpPr>
+            <a:spLocks noGrp="1" noRot="1" noChangeAspect="1"/>
+          </p:cNvSpPr>
+          <p:nvPr>
+            <p:ph type="sldImg"/>
+          </p:nvPr>
+        </p:nvSpPr>
+        <p:spPr/>
+      </p:sp>
+      <p:sp>
+        <p:nvSpPr>
+          <p:cNvPr id="3" name="Notes Placeholder 2"/>
+          <p:cNvSpPr>
+            <a:spLocks noGrp="1"/>
+          </p:cNvSpPr>
+          <p:nvPr>
+            <p:ph type="body" idx="1"/>
+          </p:nvPr>
+        </p:nvSpPr>
+        <p:spPr/>
+        <p:txBody>
+          <a:bodyPr/>
+          <a:lstStyle/>
+          <a:p>
+            <a:r>
+              <a:rPr lang="en-US" dirty="0"/>
+              <a:t>- Jordan </a:t>
+            </a:r>
+          </a:p>
+        </p:txBody>
+      </p:sp>
+      <p:sp>
+        <p:nvSpPr>
+          <p:cNvPr id="4" name="Slide Number Placeholder 3"/>
+          <p:cNvSpPr>
+            <a:spLocks noGrp="1"/>
+          </p:cNvSpPr>
+          <p:nvPr>
+            <p:ph type="sldNum" sz="quarter" idx="5"/>
+          </p:nvPr>
+        </p:nvSpPr>
+        <p:spPr/>
+        <p:txBody>
+          <a:bodyPr/>
+          <a:lstStyle/>
+          <a:p>
+            <a:fld id="{F62386AB-2375-D44E-B5C4-5F502E66C5AB}" type="slidenum">
+              <a:rPr lang="en-US" smtClean="0"/>
+              <a:t>5</a:t>
+            </a:fld>
+            <a:endParaRPr lang="en-US"/>
+          </a:p>
+        </p:txBody>
+      </p:sp>
+    </p:spTree>
+    <p:extLst>
+      <p:ext uri="{BB962C8B-B14F-4D97-AF65-F5344CB8AC3E}">
+        <p14:creationId xmlns:p14="http://schemas.microsoft.com/office/powerpoint/2010/main" val="3834153766"/>
+      </p:ext>
+    </p:extLst>
+  </p:cSld>
+  <p:clrMapOvr>
+    <a:masterClrMapping/>
+  </p:clrMapOvr>
+</p:notes>
+</file>
+
+<file path=ppt/notesSlides/notesSlide5.xml><?xml version="1.0" encoding="utf-8"?>
+<p:notes xmlns:a="http://schemas.openxmlformats.org/drawingml/2006/main" xmlns:r="http://schemas.openxmlformats.org/officeDocument/2006/relationships" xmlns:p="http://schemas.openxmlformats.org/presentationml/2006/main">
+  <p:cSld>
+    <p:spTree>
+      <p:nvGrpSpPr>
+        <p:cNvPr id="1" name=""/>
+        <p:cNvGrpSpPr/>
+        <p:nvPr/>
+      </p:nvGrpSpPr>
+      <p:grpSpPr>
+        <a:xfrm>
+          <a:off x="0" y="0"/>
+          <a:ext cx="0" cy="0"/>
+          <a:chOff x="0" y="0"/>
+          <a:chExt cx="0" cy="0"/>
+        </a:xfrm>
+      </p:grpSpPr>
+      <p:sp>
+        <p:nvSpPr>
+          <p:cNvPr id="2" name="Slide Image Placeholder 1"/>
+          <p:cNvSpPr>
+            <a:spLocks noGrp="1" noRot="1" noChangeAspect="1"/>
+          </p:cNvSpPr>
+          <p:nvPr>
+            <p:ph type="sldImg"/>
+          </p:nvPr>
+        </p:nvSpPr>
+        <p:spPr/>
+      </p:sp>
+      <p:sp>
+        <p:nvSpPr>
+          <p:cNvPr id="3" name="Notes Placeholder 2"/>
+          <p:cNvSpPr>
+            <a:spLocks noGrp="1"/>
+          </p:cNvSpPr>
+          <p:nvPr>
+            <p:ph type="body" idx="1"/>
+          </p:nvPr>
+        </p:nvSpPr>
+        <p:spPr/>
+        <p:txBody>
+          <a:bodyPr/>
+          <a:lstStyle/>
+          <a:p>
+            <a:r>
+              <a:rPr lang="en-US" dirty="0"/>
+              <a:t>- Matthew</a:t>
+            </a:r>
+          </a:p>
+        </p:txBody>
+      </p:sp>
+      <p:sp>
+        <p:nvSpPr>
+          <p:cNvPr id="4" name="Slide Number Placeholder 3"/>
+          <p:cNvSpPr>
+            <a:spLocks noGrp="1"/>
+          </p:cNvSpPr>
+          <p:nvPr>
+            <p:ph type="sldNum" sz="quarter" idx="5"/>
+          </p:nvPr>
+        </p:nvSpPr>
+        <p:spPr/>
+        <p:txBody>
+          <a:bodyPr/>
+          <a:lstStyle/>
+          <a:p>
+            <a:fld id="{F62386AB-2375-D44E-B5C4-5F502E66C5AB}" type="slidenum">
+              <a:rPr lang="en-US" smtClean="0"/>
+              <a:t>6</a:t>
+            </a:fld>
+            <a:endParaRPr lang="en-US"/>
+          </a:p>
+        </p:txBody>
+      </p:sp>
+    </p:spTree>
+    <p:extLst>
+      <p:ext uri="{BB962C8B-B14F-4D97-AF65-F5344CB8AC3E}">
+        <p14:creationId xmlns:p14="http://schemas.microsoft.com/office/powerpoint/2010/main" val="1279968571"/>
+      </p:ext>
+    </p:extLst>
+  </p:cSld>
+  <p:clrMapOvr>
+    <a:masterClrMapping/>
+  </p:clrMapOvr>
+</p:notes>
+</file>
+
+<file path=ppt/notesSlides/notesSlide6.xml><?xml version="1.0" encoding="utf-8"?>
+<p:notes xmlns:a="http://schemas.openxmlformats.org/drawingml/2006/main" xmlns:r="http://schemas.openxmlformats.org/officeDocument/2006/relationships" xmlns:p="http://schemas.openxmlformats.org/presentationml/2006/main">
+  <p:cSld>
+    <p:spTree>
+      <p:nvGrpSpPr>
+        <p:cNvPr id="1" name=""/>
+        <p:cNvGrpSpPr/>
+        <p:nvPr/>
+      </p:nvGrpSpPr>
+      <p:grpSpPr>
+        <a:xfrm>
+          <a:off x="0" y="0"/>
+          <a:ext cx="0" cy="0"/>
+          <a:chOff x="0" y="0"/>
+          <a:chExt cx="0" cy="0"/>
+        </a:xfrm>
+      </p:grpSpPr>
+      <p:sp>
+        <p:nvSpPr>
+          <p:cNvPr id="2" name="Slide Image Placeholder 1"/>
+          <p:cNvSpPr>
+            <a:spLocks noGrp="1" noRot="1" noChangeAspect="1"/>
+          </p:cNvSpPr>
+          <p:nvPr>
+            <p:ph type="sldImg"/>
+          </p:nvPr>
+        </p:nvSpPr>
+        <p:spPr/>
+      </p:sp>
+      <p:sp>
+        <p:nvSpPr>
+          <p:cNvPr id="3" name="Notes Placeholder 2"/>
+          <p:cNvSpPr>
+            <a:spLocks noGrp="1"/>
+          </p:cNvSpPr>
+          <p:nvPr>
+            <p:ph type="body" idx="1"/>
+          </p:nvPr>
+        </p:nvSpPr>
+        <p:spPr/>
+        <p:txBody>
+          <a:bodyPr/>
+          <a:lstStyle/>
+          <a:p>
+            <a:r>
+              <a:rPr lang="en-US" dirty="0"/>
+              <a:t>- Jordan </a:t>
+            </a:r>
+          </a:p>
+        </p:txBody>
+      </p:sp>
+      <p:sp>
+        <p:nvSpPr>
+          <p:cNvPr id="4" name="Slide Number Placeholder 3"/>
+          <p:cNvSpPr>
+            <a:spLocks noGrp="1"/>
+          </p:cNvSpPr>
+          <p:nvPr>
+            <p:ph type="sldNum" sz="quarter" idx="5"/>
+          </p:nvPr>
+        </p:nvSpPr>
+        <p:spPr/>
+        <p:txBody>
+          <a:bodyPr/>
+          <a:lstStyle/>
+          <a:p>
+            <a:fld id="{F62386AB-2375-D44E-B5C4-5F502E66C5AB}" type="slidenum">
+              <a:rPr lang="en-US" smtClean="0"/>
+              <a:t>7</a:t>
+            </a:fld>
+            <a:endParaRPr lang="en-US"/>
+          </a:p>
+        </p:txBody>
+      </p:sp>
+    </p:spTree>
+    <p:extLst>
+      <p:ext uri="{BB962C8B-B14F-4D97-AF65-F5344CB8AC3E}">
+        <p14:creationId xmlns:p14="http://schemas.microsoft.com/office/powerpoint/2010/main" val="1526443211"/>
+      </p:ext>
+    </p:extLst>
+  </p:cSld>
+  <p:clrMapOvr>
+    <a:masterClrMapping/>
+  </p:clrMapOvr>
+</p:notes>
+</file>
+
+<file path=ppt/notesSlides/notesSlide7.xml><?xml version="1.0" encoding="utf-8"?>
+<p:notes xmlns:a="http://schemas.openxmlformats.org/drawingml/2006/main" xmlns:r="http://schemas.openxmlformats.org/officeDocument/2006/relationships" xmlns:p="http://schemas.openxmlformats.org/presentationml/2006/main">
+  <p:cSld>
+    <p:spTree>
+      <p:nvGrpSpPr>
+        <p:cNvPr id="1" name=""/>
+        <p:cNvGrpSpPr/>
+        <p:nvPr/>
+      </p:nvGrpSpPr>
+      <p:grpSpPr>
+        <a:xfrm>
+          <a:off x="0" y="0"/>
+          <a:ext cx="0" cy="0"/>
+          <a:chOff x="0" y="0"/>
+          <a:chExt cx="0" cy="0"/>
+        </a:xfrm>
+      </p:grpSpPr>
+      <p:sp>
+        <p:nvSpPr>
+          <p:cNvPr id="2" name="Slide Image Placeholder 1"/>
+          <p:cNvSpPr>
+            <a:spLocks noGrp="1" noRot="1" noChangeAspect="1"/>
+          </p:cNvSpPr>
+          <p:nvPr>
+            <p:ph type="sldImg"/>
+          </p:nvPr>
+        </p:nvSpPr>
+        <p:spPr/>
+      </p:sp>
+      <p:sp>
+        <p:nvSpPr>
+          <p:cNvPr id="3" name="Notes Placeholder 2"/>
+          <p:cNvSpPr>
+            <a:spLocks noGrp="1"/>
+          </p:cNvSpPr>
+          <p:nvPr>
+            <p:ph type="body" idx="1"/>
+          </p:nvPr>
+        </p:nvSpPr>
+        <p:spPr/>
+        <p:txBody>
+          <a:bodyPr/>
+          <a:lstStyle/>
+          <a:p>
+            <a:r>
+              <a:rPr lang="en-US" dirty="0"/>
+              <a:t>- Alejandro</a:t>
+            </a:r>
+          </a:p>
+        </p:txBody>
+      </p:sp>
+      <p:sp>
+        <p:nvSpPr>
+          <p:cNvPr id="4" name="Slide Number Placeholder 3"/>
+          <p:cNvSpPr>
+            <a:spLocks noGrp="1"/>
+          </p:cNvSpPr>
+          <p:nvPr>
+            <p:ph type="sldNum" sz="quarter" idx="5"/>
+          </p:nvPr>
+        </p:nvSpPr>
+        <p:spPr/>
+        <p:txBody>
+          <a:bodyPr/>
+          <a:lstStyle/>
+          <a:p>
+            <a:fld id="{F62386AB-2375-D44E-B5C4-5F502E66C5AB}" type="slidenum">
+              <a:rPr lang="en-US" smtClean="0"/>
+              <a:t>8</a:t>
+            </a:fld>
+            <a:endParaRPr lang="en-US"/>
+          </a:p>
+        </p:txBody>
+      </p:sp>
+    </p:spTree>
+    <p:extLst>
+      <p:ext uri="{BB962C8B-B14F-4D97-AF65-F5344CB8AC3E}">
+        <p14:creationId xmlns:p14="http://schemas.microsoft.com/office/powerpoint/2010/main" val="1990555109"/>
+      </p:ext>
+    </p:extLst>
+  </p:cSld>
+  <p:clrMapOvr>
+    <a:masterClrMapping/>
+  </p:clrMapOvr>
+</p:notes>
+</file>
+
+<file path=ppt/notesSlides/notesSlide8.xml><?xml version="1.0" encoding="utf-8"?>
+<p:notes xmlns:a="http://schemas.openxmlformats.org/drawingml/2006/main" xmlns:r="http://schemas.openxmlformats.org/officeDocument/2006/relationships" xmlns:p="http://schemas.openxmlformats.org/presentationml/2006/main">
+  <p:cSld>
+    <p:spTree>
+      <p:nvGrpSpPr>
+        <p:cNvPr id="1" name=""/>
+        <p:cNvGrpSpPr/>
+        <p:nvPr/>
+      </p:nvGrpSpPr>
+      <p:grpSpPr>
+        <a:xfrm>
+          <a:off x="0" y="0"/>
+          <a:ext cx="0" cy="0"/>
+          <a:chOff x="0" y="0"/>
+          <a:chExt cx="0" cy="0"/>
+        </a:xfrm>
+      </p:grpSpPr>
+      <p:sp>
+        <p:nvSpPr>
+          <p:cNvPr id="2" name="Slide Image Placeholder 1"/>
+          <p:cNvSpPr>
+            <a:spLocks noGrp="1" noRot="1" noChangeAspect="1"/>
+          </p:cNvSpPr>
+          <p:nvPr>
+            <p:ph type="sldImg"/>
+          </p:nvPr>
+        </p:nvSpPr>
+        <p:spPr/>
+      </p:sp>
+      <p:sp>
+        <p:nvSpPr>
+          <p:cNvPr id="3" name="Notes Placeholder 2"/>
+          <p:cNvSpPr>
+            <a:spLocks noGrp="1"/>
+          </p:cNvSpPr>
+          <p:nvPr>
+            <p:ph type="body" idx="1"/>
+          </p:nvPr>
+        </p:nvSpPr>
+        <p:spPr/>
+        <p:txBody>
+          <a:bodyPr/>
+          <a:lstStyle/>
+          <a:p>
+            <a:r>
+              <a:rPr lang="en-US" dirty="0"/>
+              <a:t>- all </a:t>
+            </a:r>
+          </a:p>
+        </p:txBody>
+      </p:sp>
+      <p:sp>
+        <p:nvSpPr>
+          <p:cNvPr id="4" name="Slide Number Placeholder 3"/>
+          <p:cNvSpPr>
+            <a:spLocks noGrp="1"/>
+          </p:cNvSpPr>
+          <p:nvPr>
+            <p:ph type="sldNum" sz="quarter" idx="5"/>
+          </p:nvPr>
+        </p:nvSpPr>
+        <p:spPr/>
+        <p:txBody>
+          <a:bodyPr/>
+          <a:lstStyle/>
+          <a:p>
+            <a:fld id="{F62386AB-2375-D44E-B5C4-5F502E66C5AB}" type="slidenum">
+              <a:rPr lang="en-US" smtClean="0"/>
+              <a:t>9</a:t>
+            </a:fld>
+            <a:endParaRPr lang="en-US"/>
+          </a:p>
+        </p:txBody>
+      </p:sp>
+    </p:spTree>
+    <p:extLst>
+      <p:ext uri="{BB962C8B-B14F-4D97-AF65-F5344CB8AC3E}">
+        <p14:creationId xmlns:p14="http://schemas.microsoft.com/office/powerpoint/2010/main" val="364843498"/>
+      </p:ext>
+    </p:extLst>
+  </p:cSld>
+  <p:clrMapOvr>
+    <a:masterClrMapping/>
+  </p:clrMapOvr>
+</p:notes>
+</file>
+
+<file path=ppt/notesSlides/notesSlide9.xml><?xml version="1.0" encoding="utf-8"?>
+<p:notes xmlns:a="http://schemas.openxmlformats.org/drawingml/2006/main" xmlns:r="http://schemas.openxmlformats.org/officeDocument/2006/relationships" xmlns:p="http://schemas.openxmlformats.org/presentationml/2006/main">
+  <p:cSld>
+    <p:spTree>
+      <p:nvGrpSpPr>
+        <p:cNvPr id="1" name=""/>
+        <p:cNvGrpSpPr/>
+        <p:nvPr/>
+      </p:nvGrpSpPr>
+      <p:grpSpPr>
+        <a:xfrm>
+          <a:off x="0" y="0"/>
+          <a:ext cx="0" cy="0"/>
+          <a:chOff x="0" y="0"/>
+          <a:chExt cx="0" cy="0"/>
+        </a:xfrm>
+      </p:grpSpPr>
+      <p:sp>
+        <p:nvSpPr>
+          <p:cNvPr id="2" name="Slide Image Placeholder 1"/>
+          <p:cNvSpPr>
+            <a:spLocks noGrp="1" noRot="1" noChangeAspect="1"/>
+          </p:cNvSpPr>
+          <p:nvPr>
+            <p:ph type="sldImg"/>
+          </p:nvPr>
+        </p:nvSpPr>
+        <p:spPr/>
+      </p:sp>
+      <p:sp>
+        <p:nvSpPr>
+          <p:cNvPr id="3" name="Notes Placeholder 2"/>
+          <p:cNvSpPr>
+            <a:spLocks noGrp="1"/>
+          </p:cNvSpPr>
+          <p:nvPr>
+            <p:ph type="body" idx="1"/>
+          </p:nvPr>
+        </p:nvSpPr>
+        <p:spPr/>
+        <p:txBody>
+          <a:bodyPr/>
+          <a:lstStyle/>
+          <a:p>
+            <a:r>
+              <a:rPr lang="en-US" dirty="0"/>
+              <a:t>- John </a:t>
+            </a:r>
+          </a:p>
+        </p:txBody>
+      </p:sp>
+      <p:sp>
+        <p:nvSpPr>
+          <p:cNvPr id="4" name="Slide Number Placeholder 3"/>
+          <p:cNvSpPr>
+            <a:spLocks noGrp="1"/>
+          </p:cNvSpPr>
+          <p:nvPr>
+            <p:ph type="sldNum" sz="quarter" idx="5"/>
+          </p:nvPr>
+        </p:nvSpPr>
+        <p:spPr/>
+        <p:txBody>
+          <a:bodyPr/>
+          <a:lstStyle/>
+          <a:p>
+            <a:fld id="{F62386AB-2375-D44E-B5C4-5F502E66C5AB}" type="slidenum">
+              <a:rPr lang="en-US" smtClean="0"/>
+              <a:t>10</a:t>
+            </a:fld>
+            <a:endParaRPr lang="en-US"/>
+          </a:p>
+        </p:txBody>
+      </p:sp>
+    </p:spTree>
+    <p:extLst>
+      <p:ext uri="{BB962C8B-B14F-4D97-AF65-F5344CB8AC3E}">
+        <p14:creationId xmlns:p14="http://schemas.microsoft.com/office/powerpoint/2010/main" val="339046754"/>
       </p:ext>
     </p:extLst>
   </p:cSld>
@@ -4362,14 +5067,6 @@
 <file path=ppt/slides/slide10.xml><?xml version="1.0" encoding="utf-8"?>
 <p:sld xmlns:a="http://schemas.openxmlformats.org/drawingml/2006/main" xmlns:r="http://schemas.openxmlformats.org/officeDocument/2006/relationships" xmlns:p="http://schemas.openxmlformats.org/presentationml/2006/main">
   <p:cSld>
-    <p:bg>
-      <p:bgPr>
-        <a:solidFill>
-          <a:schemeClr val="bg1"/>
-        </a:solidFill>
-        <a:effectLst/>
-      </p:bgPr>
-    </p:bg>
     <p:spTree>
       <p:nvGrpSpPr>
         <p:cNvPr id="1" name=""/>
@@ -4386,567 +5083,38 @@
       </p:grpSpPr>
       <p:sp>
         <p:nvSpPr>
-          <p:cNvPr id="10" name="Rectangle 9">
+          <p:cNvPr id="2" name="Title 1">
             <a:extLst>
               <a:ext uri="{FF2B5EF4-FFF2-40B4-BE49-F238E27FC236}">
-                <a16:creationId xmlns:a16="http://schemas.microsoft.com/office/drawing/2014/main" id="{A078A52F-85EA-4C0B-962B-D9D9DD4DD78C}"/>
-              </a:ext>
-              <a:ext uri="{C183D7F6-B498-43B3-948B-1728B52AA6E4}">
-                <adec:decorative xmlns:adec="http://schemas.microsoft.com/office/drawing/2017/decorative" val="1"/>
+                <a16:creationId xmlns:a16="http://schemas.microsoft.com/office/drawing/2014/main" id="{459C96AF-DB55-4E86-8330-BC7C7F8F445F}"/>
               </a:ext>
             </a:extLst>
           </p:cNvPr>
           <p:cNvSpPr>
-            <a:spLocks noGrp="1" noRot="1" noChangeAspect="1" noMove="1" noResize="1" noEditPoints="1" noAdjustHandles="1" noChangeArrowheads="1" noChangeShapeType="1" noTextEdit="1"/>
-          </p:cNvSpPr>
-          <p:nvPr>
-            <p:extLst>
-              <p:ext uri="{386F3935-93C4-4BCD-93E2-E3B085C9AB24}">
-                <p16:designElem xmlns:p16="http://schemas.microsoft.com/office/powerpoint/2015/main" val="1"/>
-              </p:ext>
-            </p:extLst>
-          </p:nvPr>
-        </p:nvSpPr>
-        <p:spPr>
-          <a:xfrm>
-            <a:off x="446534" y="457200"/>
-            <a:ext cx="3703320" cy="94997"/>
-          </a:xfrm>
-          <a:prstGeom prst="rect">
-            <a:avLst/>
-          </a:prstGeom>
-          <a:solidFill>
-            <a:schemeClr val="accent1"/>
-          </a:solidFill>
-          <a:ln>
-            <a:noFill/>
-          </a:ln>
-          <a:effectLst/>
-        </p:spPr>
-        <p:style>
-          <a:lnRef idx="1">
-            <a:schemeClr val="accent1"/>
-          </a:lnRef>
-          <a:fillRef idx="3">
-            <a:schemeClr val="accent1"/>
-          </a:fillRef>
-          <a:effectRef idx="2">
-            <a:schemeClr val="accent1"/>
-          </a:effectRef>
-          <a:fontRef idx="minor">
-            <a:schemeClr val="lt1"/>
-          </a:fontRef>
-        </p:style>
-      </p:sp>
-      <p:sp>
-        <p:nvSpPr>
-          <p:cNvPr id="12" name="Rectangle 11">
+            <a:spLocks noGrp="1"/>
+          </p:cNvSpPr>
+          <p:nvPr>
+            <p:ph type="title"/>
+          </p:nvPr>
+        </p:nvSpPr>
+        <p:spPr/>
+        <p:txBody>
+          <a:bodyPr/>
+          <a:lstStyle/>
+          <a:p>
+            <a:r>
+              <a:rPr lang="en-US" dirty="0"/>
+              <a:t>system Sequence diagram</a:t>
+            </a:r>
+          </a:p>
+        </p:txBody>
+      </p:sp>
+      <p:pic>
+        <p:nvPicPr>
+          <p:cNvPr id="5" name="Content Placeholder 4">
             <a:extLst>
               <a:ext uri="{FF2B5EF4-FFF2-40B4-BE49-F238E27FC236}">
-                <a16:creationId xmlns:a16="http://schemas.microsoft.com/office/drawing/2014/main" id="{919797D5-5700-4683-B30A-5B4D56CB8270}"/>
-              </a:ext>
-              <a:ext uri="{C183D7F6-B498-43B3-948B-1728B52AA6E4}">
-                <adec:decorative xmlns:adec="http://schemas.microsoft.com/office/drawing/2017/decorative" val="1"/>
-              </a:ext>
-            </a:extLst>
-          </p:cNvPr>
-          <p:cNvSpPr>
-            <a:spLocks noGrp="1" noRot="1" noChangeAspect="1" noMove="1" noResize="1" noEditPoints="1" noAdjustHandles="1" noChangeArrowheads="1" noChangeShapeType="1" noTextEdit="1"/>
-          </p:cNvSpPr>
-          <p:nvPr>
-            <p:extLst>
-              <p:ext uri="{386F3935-93C4-4BCD-93E2-E3B085C9AB24}">
-                <p16:designElem xmlns:p16="http://schemas.microsoft.com/office/powerpoint/2015/main" val="1"/>
-              </p:ext>
-            </p:extLst>
-          </p:nvPr>
-        </p:nvSpPr>
-        <p:spPr>
-          <a:xfrm>
-            <a:off x="8042147" y="453643"/>
-            <a:ext cx="3703320" cy="98554"/>
-          </a:xfrm>
-          <a:prstGeom prst="rect">
-            <a:avLst/>
-          </a:prstGeom>
-          <a:solidFill>
-            <a:schemeClr val="accent4"/>
-          </a:solidFill>
-          <a:ln>
-            <a:noFill/>
-          </a:ln>
-          <a:effectLst/>
-        </p:spPr>
-        <p:style>
-          <a:lnRef idx="1">
-            <a:schemeClr val="accent1"/>
-          </a:lnRef>
-          <a:fillRef idx="3">
-            <a:schemeClr val="accent1"/>
-          </a:fillRef>
-          <a:effectRef idx="2">
-            <a:schemeClr val="accent1"/>
-          </a:effectRef>
-          <a:fontRef idx="minor">
-            <a:schemeClr val="lt1"/>
-          </a:fontRef>
-        </p:style>
-      </p:sp>
-      <p:sp>
-        <p:nvSpPr>
-          <p:cNvPr id="14" name="Rectangle 13">
-            <a:extLst>
-              <a:ext uri="{FF2B5EF4-FFF2-40B4-BE49-F238E27FC236}">
-                <a16:creationId xmlns:a16="http://schemas.microsoft.com/office/drawing/2014/main" id="{4856A7B9-9801-42EC-A4C9-7E22A56EF53D}"/>
-              </a:ext>
-              <a:ext uri="{C183D7F6-B498-43B3-948B-1728B52AA6E4}">
-                <adec:decorative xmlns:adec="http://schemas.microsoft.com/office/drawing/2017/decorative" val="1"/>
-              </a:ext>
-            </a:extLst>
-          </p:cNvPr>
-          <p:cNvSpPr>
-            <a:spLocks noGrp="1" noRot="1" noChangeAspect="1" noMove="1" noResize="1" noEditPoints="1" noAdjustHandles="1" noChangeArrowheads="1" noChangeShapeType="1" noTextEdit="1"/>
-          </p:cNvSpPr>
-          <p:nvPr>
-            <p:extLst>
-              <p:ext uri="{386F3935-93C4-4BCD-93E2-E3B085C9AB24}">
-                <p16:designElem xmlns:p16="http://schemas.microsoft.com/office/powerpoint/2015/main" val="1"/>
-              </p:ext>
-            </p:extLst>
-          </p:nvPr>
-        </p:nvSpPr>
-        <p:spPr>
-          <a:xfrm>
-            <a:off x="4241830" y="457200"/>
-            <a:ext cx="3703320" cy="91440"/>
-          </a:xfrm>
-          <a:prstGeom prst="rect">
-            <a:avLst/>
-          </a:prstGeom>
-          <a:solidFill>
-            <a:schemeClr val="accent2"/>
-          </a:solidFill>
-          <a:ln>
-            <a:noFill/>
-          </a:ln>
-          <a:effectLst/>
-        </p:spPr>
-        <p:style>
-          <a:lnRef idx="1">
-            <a:schemeClr val="accent1"/>
-          </a:lnRef>
-          <a:fillRef idx="3">
-            <a:schemeClr val="accent1"/>
-          </a:fillRef>
-          <a:effectRef idx="2">
-            <a:schemeClr val="accent1"/>
-          </a:effectRef>
-          <a:fontRef idx="minor">
-            <a:schemeClr val="lt1"/>
-          </a:fontRef>
-        </p:style>
-      </p:sp>
-      <p:sp>
-        <p:nvSpPr>
-          <p:cNvPr id="16" name="Rectangle 15">
-            <a:extLst>
-              <a:ext uri="{FF2B5EF4-FFF2-40B4-BE49-F238E27FC236}">
-                <a16:creationId xmlns:a16="http://schemas.microsoft.com/office/drawing/2014/main" id="{8AD54DB8-C150-4290-85D6-F5B0262BFEEF}"/>
-              </a:ext>
-              <a:ext uri="{C183D7F6-B498-43B3-948B-1728B52AA6E4}">
-                <adec:decorative xmlns:adec="http://schemas.microsoft.com/office/drawing/2017/decorative" val="1"/>
-              </a:ext>
-            </a:extLst>
-          </p:cNvPr>
-          <p:cNvSpPr>
-            <a:spLocks noGrp="1" noRot="1" noChangeAspect="1" noMove="1" noResize="1" noEditPoints="1" noAdjustHandles="1" noChangeArrowheads="1" noChangeShapeType="1" noTextEdit="1"/>
-          </p:cNvSpPr>
-          <p:nvPr>
-            <p:extLst>
-              <p:ext uri="{386F3935-93C4-4BCD-93E2-E3B085C9AB24}">
-                <p16:designElem xmlns:p16="http://schemas.microsoft.com/office/powerpoint/2015/main" val="1"/>
-              </p:ext>
-            </p:extLst>
-          </p:nvPr>
-        </p:nvSpPr>
-        <p:spPr>
-          <a:xfrm>
-            <a:off x="446534" y="3085765"/>
-            <a:ext cx="11262866" cy="3304800"/>
-          </a:xfrm>
-          <a:prstGeom prst="rect">
-            <a:avLst/>
-          </a:prstGeom>
-          <a:solidFill>
-            <a:schemeClr val="accent1"/>
-          </a:solidFill>
-          <a:ln>
-            <a:noFill/>
-          </a:ln>
-          <a:effectLst/>
-        </p:spPr>
-        <p:style>
-          <a:lnRef idx="1">
-            <a:schemeClr val="accent1"/>
-          </a:lnRef>
-          <a:fillRef idx="3">
-            <a:schemeClr val="accent1"/>
-          </a:fillRef>
-          <a:effectRef idx="2">
-            <a:schemeClr val="accent1"/>
-          </a:effectRef>
-          <a:fontRef idx="minor">
-            <a:schemeClr val="lt1"/>
-          </a:fontRef>
-        </p:style>
-      </p:sp>
-      <p:sp useBgFill="1">
-        <p:nvSpPr>
-          <p:cNvPr id="18" name="Rectangle 17">
-            <a:extLst>
-              <a:ext uri="{FF2B5EF4-FFF2-40B4-BE49-F238E27FC236}">
-                <a16:creationId xmlns:a16="http://schemas.microsoft.com/office/drawing/2014/main" id="{379F11E2-8BA5-4C5C-AE7C-361E5EA011FF}"/>
-              </a:ext>
-              <a:ext uri="{C183D7F6-B498-43B3-948B-1728B52AA6E4}">
-                <adec:decorative xmlns:adec="http://schemas.microsoft.com/office/drawing/2017/decorative" val="1"/>
-              </a:ext>
-            </a:extLst>
-          </p:cNvPr>
-          <p:cNvSpPr>
-            <a:spLocks noGrp="1" noRot="1" noChangeAspect="1" noMove="1" noResize="1" noEditPoints="1" noAdjustHandles="1" noChangeArrowheads="1" noChangeShapeType="1" noTextEdit="1"/>
-          </p:cNvSpPr>
-          <p:nvPr>
-            <p:extLst>
-              <p:ext uri="{386F3935-93C4-4BCD-93E2-E3B085C9AB24}">
-                <p16:designElem xmlns:p16="http://schemas.microsoft.com/office/powerpoint/2015/main" val="1"/>
-              </p:ext>
-            </p:extLst>
-          </p:nvPr>
-        </p:nvSpPr>
-        <p:spPr>
-          <a:xfrm>
-            <a:off x="0" y="1"/>
-            <a:ext cx="12191999" cy="6858000"/>
-          </a:xfrm>
-          <a:prstGeom prst="rect">
-            <a:avLst/>
-          </a:prstGeom>
-          <a:ln>
-            <a:noFill/>
-          </a:ln>
-        </p:spPr>
-        <p:style>
-          <a:lnRef idx="2">
-            <a:schemeClr val="accent1">
-              <a:shade val="50000"/>
-            </a:schemeClr>
-          </a:lnRef>
-          <a:fillRef idx="1">
-            <a:schemeClr val="accent1"/>
-          </a:fillRef>
-          <a:effectRef idx="0">
-            <a:schemeClr val="accent1"/>
-          </a:effectRef>
-          <a:fontRef idx="minor">
-            <a:schemeClr val="lt1"/>
-          </a:fontRef>
-        </p:style>
-        <p:txBody>
-          <a:bodyPr rtlCol="0" anchor="ctr"/>
-          <a:lstStyle/>
-          <a:p>
-            <a:pPr algn="ctr"/>
-            <a:endParaRPr lang="en-US"/>
-          </a:p>
-        </p:txBody>
-      </p:sp>
-      <p:sp>
-        <p:nvSpPr>
-          <p:cNvPr id="20" name="Rectangle 19">
-            <a:extLst>
-              <a:ext uri="{FF2B5EF4-FFF2-40B4-BE49-F238E27FC236}">
-                <a16:creationId xmlns:a16="http://schemas.microsoft.com/office/drawing/2014/main" id="{7C00E1DA-EC7C-40FC-95E3-11FDCD2E4291}"/>
-              </a:ext>
-              <a:ext uri="{C183D7F6-B498-43B3-948B-1728B52AA6E4}">
-                <adec:decorative xmlns:adec="http://schemas.microsoft.com/office/drawing/2017/decorative" val="1"/>
-              </a:ext>
-            </a:extLst>
-          </p:cNvPr>
-          <p:cNvSpPr>
-            <a:spLocks noGrp="1" noRot="1" noChangeAspect="1" noMove="1" noResize="1" noEditPoints="1" noAdjustHandles="1" noChangeArrowheads="1" noChangeShapeType="1" noTextEdit="1"/>
-          </p:cNvSpPr>
-          <p:nvPr>
-            <p:extLst>
-              <p:ext uri="{386F3935-93C4-4BCD-93E2-E3B085C9AB24}">
-                <p16:designElem xmlns:p16="http://schemas.microsoft.com/office/powerpoint/2015/main" val="1"/>
-              </p:ext>
-            </p:extLst>
-          </p:nvPr>
-        </p:nvSpPr>
-        <p:spPr>
-          <a:xfrm>
-            <a:off x="8042147" y="723899"/>
-            <a:ext cx="3703320" cy="5666666"/>
-          </a:xfrm>
-          <a:prstGeom prst="rect">
-            <a:avLst/>
-          </a:prstGeom>
-          <a:solidFill>
-            <a:schemeClr val="accent1"/>
-          </a:solidFill>
-          <a:ln>
-            <a:noFill/>
-          </a:ln>
-          <a:effectLst/>
-        </p:spPr>
-        <p:style>
-          <a:lnRef idx="1">
-            <a:schemeClr val="accent1"/>
-          </a:lnRef>
-          <a:fillRef idx="3">
-            <a:schemeClr val="accent1"/>
-          </a:fillRef>
-          <a:effectRef idx="2">
-            <a:schemeClr val="accent1"/>
-          </a:effectRef>
-          <a:fontRef idx="minor">
-            <a:schemeClr val="lt1"/>
-          </a:fontRef>
-        </p:style>
-      </p:sp>
-      <p:sp>
-        <p:nvSpPr>
-          <p:cNvPr id="2" name="Title 1">
-            <a:extLst>
-              <a:ext uri="{FF2B5EF4-FFF2-40B4-BE49-F238E27FC236}">
-                <a16:creationId xmlns:a16="http://schemas.microsoft.com/office/drawing/2014/main" id="{22985F90-DE37-AA4B-AC91-BB99F131D941}"/>
-              </a:ext>
-            </a:extLst>
-          </p:cNvPr>
-          <p:cNvSpPr>
-            <a:spLocks noGrp="1"/>
-          </p:cNvSpPr>
-          <p:nvPr>
-            <p:ph type="title"/>
-          </p:nvPr>
-        </p:nvSpPr>
-        <p:spPr>
-          <a:xfrm>
-            <a:off x="8296275" y="1419225"/>
-            <a:ext cx="3081576" cy="2085869"/>
-          </a:xfrm>
-        </p:spPr>
-        <p:txBody>
-          <a:bodyPr vert="horz" lIns="91440" tIns="45720" rIns="91440" bIns="45720" rtlCol="0" anchor="b">
-            <a:normAutofit/>
-          </a:bodyPr>
-          <a:lstStyle/>
-          <a:p>
-            <a:r>
-              <a:rPr lang="en-US" sz="3200" dirty="0">
-                <a:solidFill>
-                  <a:srgbClr val="FFFFFF"/>
-                </a:solidFill>
-              </a:rPr>
-              <a:t>Traceability Matrix </a:t>
-            </a:r>
-          </a:p>
-        </p:txBody>
-      </p:sp>
-      <p:grpSp>
-        <p:nvGrpSpPr>
-          <p:cNvPr id="22" name="Group 21">
-            <a:extLst>
-              <a:ext uri="{FF2B5EF4-FFF2-40B4-BE49-F238E27FC236}">
-                <a16:creationId xmlns:a16="http://schemas.microsoft.com/office/drawing/2014/main" id="{9A421166-2996-41A7-B094-AE5316F347DD}"/>
-              </a:ext>
-              <a:ext uri="{C183D7F6-B498-43B3-948B-1728B52AA6E4}">
-                <adec:decorative xmlns:adec="http://schemas.microsoft.com/office/drawing/2017/decorative" val="1"/>
-              </a:ext>
-            </a:extLst>
-          </p:cNvPr>
-          <p:cNvGrpSpPr>
-            <a:grpSpLocks noGrp="1" noUngrp="1" noRot="1" noChangeAspect="1" noMove="1" noResize="1"/>
-          </p:cNvGrpSpPr>
-          <p:nvPr>
-            <p:extLst>
-              <p:ext uri="{386F3935-93C4-4BCD-93E2-E3B085C9AB24}">
-                <p16:designElem xmlns:p16="http://schemas.microsoft.com/office/powerpoint/2015/main" val="1"/>
-              </p:ext>
-            </p:extLst>
-          </p:nvPr>
-        </p:nvGrpSpPr>
-        <p:grpSpPr>
-          <a:xfrm>
-            <a:off x="446534" y="453643"/>
-            <a:ext cx="11298933" cy="98554"/>
-            <a:chOff x="446534" y="453643"/>
-            <a:chExt cx="11298933" cy="98554"/>
-          </a:xfrm>
-        </p:grpSpPr>
-        <p:sp>
-          <p:nvSpPr>
-            <p:cNvPr id="23" name="Rectangle 22">
-              <a:extLst>
-                <a:ext uri="{FF2B5EF4-FFF2-40B4-BE49-F238E27FC236}">
-                  <a16:creationId xmlns:a16="http://schemas.microsoft.com/office/drawing/2014/main" id="{FDBB1B92-A3EB-43E4-8FAB-D20E8ED14CEF}"/>
-                </a:ext>
-                <a:ext uri="{C183D7F6-B498-43B3-948B-1728B52AA6E4}">
-                  <adec:decorative xmlns:adec="http://schemas.microsoft.com/office/drawing/2017/decorative" val="1"/>
-                </a:ext>
-              </a:extLst>
-            </p:cNvPr>
-            <p:cNvSpPr/>
-            <p:nvPr>
-              <p:extLst>
-                <p:ext uri="{386F3935-93C4-4BCD-93E2-E3B085C9AB24}">
-                  <p16:designElem xmlns:p16="http://schemas.microsoft.com/office/powerpoint/2015/main" val="1"/>
-                </p:ext>
-              </p:extLst>
-            </p:nvPr>
-          </p:nvSpPr>
-          <p:spPr>
-            <a:xfrm>
-              <a:off x="446534" y="457200"/>
-              <a:ext cx="3703320" cy="94997"/>
-            </a:xfrm>
-            <a:prstGeom prst="rect">
-              <a:avLst/>
-            </a:prstGeom>
-            <a:solidFill>
-              <a:schemeClr val="accent1"/>
-            </a:solidFill>
-            <a:ln>
-              <a:noFill/>
-            </a:ln>
-            <a:effectLst/>
-          </p:spPr>
-          <p:style>
-            <a:lnRef idx="1">
-              <a:schemeClr val="accent1"/>
-            </a:lnRef>
-            <a:fillRef idx="3">
-              <a:schemeClr val="accent1"/>
-            </a:fillRef>
-            <a:effectRef idx="2">
-              <a:schemeClr val="accent1"/>
-            </a:effectRef>
-            <a:fontRef idx="minor">
-              <a:schemeClr val="lt1"/>
-            </a:fontRef>
-          </p:style>
-        </p:sp>
-        <p:sp>
-          <p:nvSpPr>
-            <p:cNvPr id="24" name="Rectangle 23">
-              <a:extLst>
-                <a:ext uri="{FF2B5EF4-FFF2-40B4-BE49-F238E27FC236}">
-                  <a16:creationId xmlns:a16="http://schemas.microsoft.com/office/drawing/2014/main" id="{3F3972F4-FE7E-48EA-AAD8-9BE5750A6672}"/>
-                </a:ext>
-                <a:ext uri="{C183D7F6-B498-43B3-948B-1728B52AA6E4}">
-                  <adec:decorative xmlns:adec="http://schemas.microsoft.com/office/drawing/2017/decorative" val="1"/>
-                </a:ext>
-              </a:extLst>
-            </p:cNvPr>
-            <p:cNvSpPr/>
-            <p:nvPr>
-              <p:extLst>
-                <p:ext uri="{386F3935-93C4-4BCD-93E2-E3B085C9AB24}">
-                  <p16:designElem xmlns:p16="http://schemas.microsoft.com/office/powerpoint/2015/main" val="1"/>
-                </p:ext>
-              </p:extLst>
-            </p:nvPr>
-          </p:nvSpPr>
-          <p:spPr>
-            <a:xfrm>
-              <a:off x="8042147" y="453643"/>
-              <a:ext cx="3703320" cy="98554"/>
-            </a:xfrm>
-            <a:prstGeom prst="rect">
-              <a:avLst/>
-            </a:prstGeom>
-            <a:solidFill>
-              <a:schemeClr val="accent4"/>
-            </a:solidFill>
-            <a:ln>
-              <a:noFill/>
-            </a:ln>
-            <a:effectLst/>
-          </p:spPr>
-          <p:style>
-            <a:lnRef idx="1">
-              <a:schemeClr val="accent1"/>
-            </a:lnRef>
-            <a:fillRef idx="3">
-              <a:schemeClr val="accent1"/>
-            </a:fillRef>
-            <a:effectRef idx="2">
-              <a:schemeClr val="accent1"/>
-            </a:effectRef>
-            <a:fontRef idx="minor">
-              <a:schemeClr val="lt1"/>
-            </a:fontRef>
-          </p:style>
-        </p:sp>
-        <p:sp>
-          <p:nvSpPr>
-            <p:cNvPr id="25" name="Rectangle 24">
-              <a:extLst>
-                <a:ext uri="{FF2B5EF4-FFF2-40B4-BE49-F238E27FC236}">
-                  <a16:creationId xmlns:a16="http://schemas.microsoft.com/office/drawing/2014/main" id="{221614E5-870B-4D5E-A43B-8FF7E5323484}"/>
-                </a:ext>
-                <a:ext uri="{C183D7F6-B498-43B3-948B-1728B52AA6E4}">
-                  <adec:decorative xmlns:adec="http://schemas.microsoft.com/office/drawing/2017/decorative" val="1"/>
-                </a:ext>
-              </a:extLst>
-            </p:cNvPr>
-            <p:cNvSpPr/>
-            <p:nvPr>
-              <p:extLst>
-                <p:ext uri="{386F3935-93C4-4BCD-93E2-E3B085C9AB24}">
-                  <p16:designElem xmlns:p16="http://schemas.microsoft.com/office/powerpoint/2015/main" val="1"/>
-                </p:ext>
-              </p:extLst>
-            </p:nvPr>
-          </p:nvSpPr>
-          <p:spPr>
-            <a:xfrm>
-              <a:off x="4241830" y="457200"/>
-              <a:ext cx="3703320" cy="91440"/>
-            </a:xfrm>
-            <a:prstGeom prst="rect">
-              <a:avLst/>
-            </a:prstGeom>
-            <a:solidFill>
-              <a:schemeClr val="accent2"/>
-            </a:solidFill>
-            <a:ln>
-              <a:noFill/>
-            </a:ln>
-            <a:effectLst/>
-          </p:spPr>
-          <p:style>
-            <a:lnRef idx="1">
-              <a:schemeClr val="accent1"/>
-            </a:lnRef>
-            <a:fillRef idx="3">
-              <a:schemeClr val="accent1"/>
-            </a:fillRef>
-            <a:effectRef idx="2">
-              <a:schemeClr val="accent1"/>
-            </a:effectRef>
-            <a:fontRef idx="minor">
-              <a:schemeClr val="lt1"/>
-            </a:fontRef>
-          </p:style>
-        </p:sp>
-      </p:grpSp>
-      <p:pic>
-        <p:nvPicPr>
-          <p:cNvPr id="9" name="Content Placeholder 8" descr="A close up of text on a white background&#10;&#10;Description automatically generated">
-            <a:extLst>
-              <a:ext uri="{FF2B5EF4-FFF2-40B4-BE49-F238E27FC236}">
-                <a16:creationId xmlns:a16="http://schemas.microsoft.com/office/drawing/2014/main" id="{5202F20A-FADA-2749-AFC1-F489DCC35A44}"/>
+                <a16:creationId xmlns:a16="http://schemas.microsoft.com/office/drawing/2014/main" id="{9699E457-B4A6-6148-9141-9724AAC4117B}"/>
               </a:ext>
             </a:extLst>
           </p:cNvPr>
@@ -4958,22 +5126,205 @@
           </p:nvPr>
         </p:nvPicPr>
         <p:blipFill>
-          <a:blip r:embed="rId2"/>
+          <a:blip r:embed="rId3"/>
           <a:stretch>
             <a:fillRect/>
           </a:stretch>
         </p:blipFill>
         <p:spPr>
           <a:xfrm>
-            <a:off x="482600" y="592336"/>
-            <a:ext cx="5613400" cy="6265663"/>
+            <a:off x="322859" y="1693751"/>
+            <a:ext cx="3816804" cy="5401261"/>
           </a:xfrm>
         </p:spPr>
       </p:pic>
+      <p:sp>
+        <p:nvSpPr>
+          <p:cNvPr id="6" name="TextBox 5">
+            <a:extLst>
+              <a:ext uri="{FF2B5EF4-FFF2-40B4-BE49-F238E27FC236}">
+                <a16:creationId xmlns:a16="http://schemas.microsoft.com/office/drawing/2014/main" id="{9DE5A6B7-0A9F-FE45-8E63-1EB94854B5EB}"/>
+              </a:ext>
+            </a:extLst>
+          </p:cNvPr>
+          <p:cNvSpPr txBox="1"/>
+          <p:nvPr/>
+        </p:nvSpPr>
+        <p:spPr>
+          <a:xfrm>
+            <a:off x="1185426" y="5694179"/>
+            <a:ext cx="2091670" cy="646331"/>
+          </a:xfrm>
+          <a:prstGeom prst="rect">
+            <a:avLst/>
+          </a:prstGeom>
+          <a:noFill/>
+        </p:spPr>
+        <p:txBody>
+          <a:bodyPr wrap="square" rtlCol="0">
+            <a:spAutoFit/>
+          </a:bodyPr>
+          <a:lstStyle/>
+          <a:p>
+            <a:r>
+              <a:rPr lang="en-US" dirty="0"/>
+              <a:t>Schedule Patient</a:t>
+            </a:r>
+          </a:p>
+          <a:p>
+            <a:endParaRPr lang="en-US" dirty="0"/>
+          </a:p>
+        </p:txBody>
+      </p:sp>
+      <p:pic>
+        <p:nvPicPr>
+          <p:cNvPr id="8" name="Picture 7">
+            <a:extLst>
+              <a:ext uri="{FF2B5EF4-FFF2-40B4-BE49-F238E27FC236}">
+                <a16:creationId xmlns:a16="http://schemas.microsoft.com/office/drawing/2014/main" id="{A65989DE-AFB9-0848-85DF-265B4C1F204F}"/>
+              </a:ext>
+            </a:extLst>
+          </p:cNvPr>
+          <p:cNvPicPr>
+            <a:picLocks noChangeAspect="1"/>
+          </p:cNvPicPr>
+          <p:nvPr/>
+        </p:nvPicPr>
+        <p:blipFill>
+          <a:blip r:embed="rId4"/>
+          <a:stretch>
+            <a:fillRect/>
+          </a:stretch>
+        </p:blipFill>
+        <p:spPr>
+          <a:xfrm>
+            <a:off x="4766664" y="1693751"/>
+            <a:ext cx="2954237" cy="4180618"/>
+          </a:xfrm>
+          <a:prstGeom prst="rect">
+            <a:avLst/>
+          </a:prstGeom>
+        </p:spPr>
+      </p:pic>
+      <p:sp>
+        <p:nvSpPr>
+          <p:cNvPr id="9" name="TextBox 8">
+            <a:extLst>
+              <a:ext uri="{FF2B5EF4-FFF2-40B4-BE49-F238E27FC236}">
+                <a16:creationId xmlns:a16="http://schemas.microsoft.com/office/drawing/2014/main" id="{198AC003-4B3C-9946-B23F-929D67E85998}"/>
+              </a:ext>
+            </a:extLst>
+          </p:cNvPr>
+          <p:cNvSpPr txBox="1"/>
+          <p:nvPr/>
+        </p:nvSpPr>
+        <p:spPr>
+          <a:xfrm>
+            <a:off x="5696897" y="5676047"/>
+            <a:ext cx="1093770" cy="923330"/>
+          </a:xfrm>
+          <a:prstGeom prst="rect">
+            <a:avLst/>
+          </a:prstGeom>
+          <a:noFill/>
+        </p:spPr>
+        <p:txBody>
+          <a:bodyPr wrap="square" rtlCol="0">
+            <a:spAutoFit/>
+          </a:bodyPr>
+          <a:lstStyle/>
+          <a:p>
+            <a:r>
+              <a:rPr lang="en-US" dirty="0"/>
+              <a:t>Diagnosis</a:t>
+            </a:r>
+          </a:p>
+          <a:p>
+            <a:endParaRPr lang="en-US" dirty="0"/>
+          </a:p>
+          <a:p>
+            <a:endParaRPr lang="en-US" dirty="0"/>
+          </a:p>
+        </p:txBody>
+      </p:sp>
+      <p:pic>
+        <p:nvPicPr>
+          <p:cNvPr id="11" name="Picture 10">
+            <a:extLst>
+              <a:ext uri="{FF2B5EF4-FFF2-40B4-BE49-F238E27FC236}">
+                <a16:creationId xmlns:a16="http://schemas.microsoft.com/office/drawing/2014/main" id="{2F88D2FD-3710-154E-B379-784F1BFD62DD}"/>
+              </a:ext>
+            </a:extLst>
+          </p:cNvPr>
+          <p:cNvPicPr>
+            <a:picLocks noChangeAspect="1"/>
+          </p:cNvPicPr>
+          <p:nvPr/>
+        </p:nvPicPr>
+        <p:blipFill>
+          <a:blip r:embed="rId5"/>
+          <a:stretch>
+            <a:fillRect/>
+          </a:stretch>
+        </p:blipFill>
+        <p:spPr>
+          <a:xfrm>
+            <a:off x="8583468" y="237012"/>
+            <a:ext cx="4846211" cy="6858000"/>
+          </a:xfrm>
+          <a:prstGeom prst="rect">
+            <a:avLst/>
+          </a:prstGeom>
+        </p:spPr>
+      </p:pic>
+      <p:sp>
+        <p:nvSpPr>
+          <p:cNvPr id="12" name="TextBox 11">
+            <a:extLst>
+              <a:ext uri="{FF2B5EF4-FFF2-40B4-BE49-F238E27FC236}">
+                <a16:creationId xmlns:a16="http://schemas.microsoft.com/office/drawing/2014/main" id="{FB2EE277-C489-BF41-BEAF-05576D9A384F}"/>
+              </a:ext>
+            </a:extLst>
+          </p:cNvPr>
+          <p:cNvSpPr txBox="1"/>
+          <p:nvPr/>
+        </p:nvSpPr>
+        <p:spPr>
+          <a:xfrm>
+            <a:off x="9563006" y="6382036"/>
+            <a:ext cx="1953598" cy="1200329"/>
+          </a:xfrm>
+          <a:prstGeom prst="rect">
+            <a:avLst/>
+          </a:prstGeom>
+          <a:noFill/>
+        </p:spPr>
+        <p:txBody>
+          <a:bodyPr wrap="square" rtlCol="0">
+            <a:spAutoFit/>
+          </a:bodyPr>
+          <a:lstStyle/>
+          <a:p>
+            <a:r>
+              <a:rPr lang="en-US" dirty="0"/>
+              <a:t>Patient Prescribe</a:t>
+            </a:r>
+          </a:p>
+          <a:p>
+            <a:endParaRPr lang="en-US" dirty="0"/>
+          </a:p>
+          <a:p>
+            <a:endParaRPr lang="en-US" dirty="0"/>
+          </a:p>
+          <a:p>
+            <a:endParaRPr lang="en-US" dirty="0"/>
+          </a:p>
+        </p:txBody>
+      </p:sp>
     </p:spTree>
     <p:extLst>
       <p:ext uri="{BB962C8B-B14F-4D97-AF65-F5344CB8AC3E}">
-        <p14:creationId xmlns:p14="http://schemas.microsoft.com/office/powerpoint/2010/main" val="4059952136"/>
+        <p14:creationId xmlns:p14="http://schemas.microsoft.com/office/powerpoint/2010/main" val="581362772"/>
       </p:ext>
     </p:extLst>
   </p:cSld>
@@ -5725,7 +6076,7 @@
           <p:cNvPr id="2" name="Title 1">
             <a:extLst>
               <a:ext uri="{FF2B5EF4-FFF2-40B4-BE49-F238E27FC236}">
-                <a16:creationId xmlns:a16="http://schemas.microsoft.com/office/drawing/2014/main" id="{41AF472D-A831-424E-9109-3CA136320E99}"/>
+                <a16:creationId xmlns:a16="http://schemas.microsoft.com/office/drawing/2014/main" id="{61856C70-F94C-4A04-B676-7655DDB0314C}"/>
               </a:ext>
             </a:extLst>
           </p:cNvPr>
@@ -5743,45 +6094,44 @@
           <a:p>
             <a:r>
               <a:rPr lang="en-US" dirty="0"/>
-              <a:t>Domain model</a:t>
+              <a:t>Gantt diagram</a:t>
             </a:r>
           </a:p>
         </p:txBody>
       </p:sp>
       <p:pic>
         <p:nvPicPr>
-          <p:cNvPr id="9" name="Picture 8" descr="A close up of a map&#10;&#10;Description automatically generated">
+          <p:cNvPr id="12" name="Content Placeholder 11" descr="A close up of a building&#10;&#10;Description automatically generated">
             <a:extLst>
               <a:ext uri="{FF2B5EF4-FFF2-40B4-BE49-F238E27FC236}">
-                <a16:creationId xmlns:a16="http://schemas.microsoft.com/office/drawing/2014/main" id="{1B7B6F19-2881-5E45-80A7-EF2E2F2DF7CB}"/>
+                <a16:creationId xmlns:a16="http://schemas.microsoft.com/office/drawing/2014/main" id="{9004F88B-2AC6-F74E-8803-28F7BAE231BE}"/>
               </a:ext>
             </a:extLst>
           </p:cNvPr>
           <p:cNvPicPr>
-            <a:picLocks noChangeAspect="1"/>
+            <a:picLocks noGrp="1" noChangeAspect="1"/>
           </p:cNvPicPr>
-          <p:nvPr/>
+          <p:nvPr>
+            <p:ph idx="1"/>
+          </p:nvPr>
         </p:nvPicPr>
         <p:blipFill>
-          <a:blip r:embed="rId2"/>
+          <a:blip r:embed="rId3"/>
           <a:stretch>
             <a:fillRect/>
           </a:stretch>
         </p:blipFill>
         <p:spPr>
           <a:xfrm>
-            <a:off x="2503344" y="1851950"/>
-            <a:ext cx="7185312" cy="4839088"/>
-          </a:xfrm>
-          <a:prstGeom prst="rect">
-            <a:avLst/>
-          </a:prstGeom>
+            <a:off x="415519" y="1983545"/>
+            <a:ext cx="11360962" cy="4438627"/>
+          </a:xfrm>
         </p:spPr>
       </p:pic>
     </p:spTree>
     <p:extLst>
       <p:ext uri="{BB962C8B-B14F-4D97-AF65-F5344CB8AC3E}">
-        <p14:creationId xmlns:p14="http://schemas.microsoft.com/office/powerpoint/2010/main" val="3172992042"/>
+        <p14:creationId xmlns:p14="http://schemas.microsoft.com/office/powerpoint/2010/main" val="3161514390"/>
       </p:ext>
     </p:extLst>
   </p:cSld>
@@ -5813,7 +6163,7 @@
           <p:cNvPr id="2" name="Title 1">
             <a:extLst>
               <a:ext uri="{FF2B5EF4-FFF2-40B4-BE49-F238E27FC236}">
-                <a16:creationId xmlns:a16="http://schemas.microsoft.com/office/drawing/2014/main" id="{61856C70-F94C-4A04-B676-7655DDB0314C}"/>
+                <a16:creationId xmlns:a16="http://schemas.microsoft.com/office/drawing/2014/main" id="{41AF472D-A831-424E-9109-3CA136320E99}"/>
               </a:ext>
             </a:extLst>
           </p:cNvPr>
@@ -5831,44 +6181,45 @@
           <a:p>
             <a:r>
               <a:rPr lang="en-US" dirty="0"/>
-              <a:t>Gantt diagram</a:t>
+              <a:t>Domain model</a:t>
             </a:r>
           </a:p>
         </p:txBody>
       </p:sp>
       <p:pic>
         <p:nvPicPr>
-          <p:cNvPr id="12" name="Content Placeholder 11" descr="A close up of a building&#10;&#10;Description automatically generated">
+          <p:cNvPr id="9" name="Picture 8" descr="A close up of a map&#10;&#10;Description automatically generated">
             <a:extLst>
               <a:ext uri="{FF2B5EF4-FFF2-40B4-BE49-F238E27FC236}">
-                <a16:creationId xmlns:a16="http://schemas.microsoft.com/office/drawing/2014/main" id="{9004F88B-2AC6-F74E-8803-28F7BAE231BE}"/>
+                <a16:creationId xmlns:a16="http://schemas.microsoft.com/office/drawing/2014/main" id="{1B7B6F19-2881-5E45-80A7-EF2E2F2DF7CB}"/>
               </a:ext>
             </a:extLst>
           </p:cNvPr>
           <p:cNvPicPr>
-            <a:picLocks noGrp="1" noChangeAspect="1"/>
+            <a:picLocks noChangeAspect="1"/>
           </p:cNvPicPr>
-          <p:nvPr>
-            <p:ph idx="1"/>
-          </p:nvPr>
+          <p:nvPr/>
         </p:nvPicPr>
         <p:blipFill>
-          <a:blip r:embed="rId2"/>
+          <a:blip r:embed="rId3"/>
           <a:stretch>
             <a:fillRect/>
           </a:stretch>
         </p:blipFill>
         <p:spPr>
           <a:xfrm>
-            <a:off x="415519" y="1983545"/>
-            <a:ext cx="11360962" cy="4438627"/>
-          </a:xfrm>
+            <a:off x="2503344" y="1851950"/>
+            <a:ext cx="7185312" cy="4839088"/>
+          </a:xfrm>
+          <a:prstGeom prst="rect">
+            <a:avLst/>
+          </a:prstGeom>
         </p:spPr>
       </p:pic>
     </p:spTree>
     <p:extLst>
       <p:ext uri="{BB962C8B-B14F-4D97-AF65-F5344CB8AC3E}">
-        <p14:creationId xmlns:p14="http://schemas.microsoft.com/office/powerpoint/2010/main" val="3161514390"/>
+        <p14:creationId xmlns:p14="http://schemas.microsoft.com/office/powerpoint/2010/main" val="3172992042"/>
       </p:ext>
     </p:extLst>
   </p:cSld>
@@ -5900,7 +6251,7 @@
           <p:cNvPr id="2" name="Title 1">
             <a:extLst>
               <a:ext uri="{FF2B5EF4-FFF2-40B4-BE49-F238E27FC236}">
-                <a16:creationId xmlns:a16="http://schemas.microsoft.com/office/drawing/2014/main" id="{459C96AF-DB55-4E86-8330-BC7C7F8F445F}"/>
+                <a16:creationId xmlns:a16="http://schemas.microsoft.com/office/drawing/2014/main" id="{AF22BCDE-958B-4E7D-8A92-7F4942518B66}"/>
               </a:ext>
             </a:extLst>
           </p:cNvPr>
@@ -5918,84 +6269,17 @@
           <a:p>
             <a:r>
               <a:rPr lang="en-US" dirty="0"/>
-              <a:t>Sequence system diagram</a:t>
+              <a:t>User Interface</a:t>
             </a:r>
           </a:p>
         </p:txBody>
       </p:sp>
       <p:pic>
         <p:nvPicPr>
-          <p:cNvPr id="5" name="Content Placeholder 4">
+          <p:cNvPr id="14" name="Picture 13" descr="A screenshot of a cell phone&#10;&#10;Description automatically generated">
             <a:extLst>
               <a:ext uri="{FF2B5EF4-FFF2-40B4-BE49-F238E27FC236}">
-                <a16:creationId xmlns:a16="http://schemas.microsoft.com/office/drawing/2014/main" id="{9699E457-B4A6-6148-9141-9724AAC4117B}"/>
-              </a:ext>
-            </a:extLst>
-          </p:cNvPr>
-          <p:cNvPicPr>
-            <a:picLocks noGrp="1" noChangeAspect="1"/>
-          </p:cNvPicPr>
-          <p:nvPr>
-            <p:ph idx="1"/>
-          </p:nvPr>
-        </p:nvPicPr>
-        <p:blipFill>
-          <a:blip r:embed="rId2"/>
-          <a:stretch>
-            <a:fillRect/>
-          </a:stretch>
-        </p:blipFill>
-        <p:spPr>
-          <a:xfrm>
-            <a:off x="322859" y="1693751"/>
-            <a:ext cx="3816804" cy="5401261"/>
-          </a:xfrm>
-        </p:spPr>
-      </p:pic>
-      <p:sp>
-        <p:nvSpPr>
-          <p:cNvPr id="6" name="TextBox 5">
-            <a:extLst>
-              <a:ext uri="{FF2B5EF4-FFF2-40B4-BE49-F238E27FC236}">
-                <a16:creationId xmlns:a16="http://schemas.microsoft.com/office/drawing/2014/main" id="{9DE5A6B7-0A9F-FE45-8E63-1EB94854B5EB}"/>
-              </a:ext>
-            </a:extLst>
-          </p:cNvPr>
-          <p:cNvSpPr txBox="1"/>
-          <p:nvPr/>
-        </p:nvSpPr>
-        <p:spPr>
-          <a:xfrm>
-            <a:off x="1185426" y="5694179"/>
-            <a:ext cx="2091670" cy="646331"/>
-          </a:xfrm>
-          <a:prstGeom prst="rect">
-            <a:avLst/>
-          </a:prstGeom>
-          <a:noFill/>
-        </p:spPr>
-        <p:txBody>
-          <a:bodyPr wrap="square" rtlCol="0">
-            <a:spAutoFit/>
-          </a:bodyPr>
-          <a:lstStyle/>
-          <a:p>
-            <a:r>
-              <a:rPr lang="en-US" dirty="0"/>
-              <a:t>Schedule Patient</a:t>
-            </a:r>
-          </a:p>
-          <a:p>
-            <a:endParaRPr lang="en-US" dirty="0"/>
-          </a:p>
-        </p:txBody>
-      </p:sp>
-      <p:pic>
-        <p:nvPicPr>
-          <p:cNvPr id="8" name="Picture 7">
-            <a:extLst>
-              <a:ext uri="{FF2B5EF4-FFF2-40B4-BE49-F238E27FC236}">
-                <a16:creationId xmlns:a16="http://schemas.microsoft.com/office/drawing/2014/main" id="{A65989DE-AFB9-0848-85DF-265B4C1F204F}"/>
+                <a16:creationId xmlns:a16="http://schemas.microsoft.com/office/drawing/2014/main" id="{F45D1B9C-CB9F-A444-BE8D-98A987C638B6}"/>
               </a:ext>
             </a:extLst>
           </p:cNvPr>
@@ -6012,61 +6296,20 @@
         </p:blipFill>
         <p:spPr>
           <a:xfrm>
-            <a:off x="4766664" y="1693751"/>
-            <a:ext cx="2954237" cy="4180618"/>
+            <a:off x="423481" y="1909822"/>
+            <a:ext cx="5634279" cy="4103225"/>
           </a:xfrm>
           <a:prstGeom prst="rect">
             <a:avLst/>
           </a:prstGeom>
         </p:spPr>
       </p:pic>
-      <p:sp>
-        <p:nvSpPr>
-          <p:cNvPr id="9" name="TextBox 8">
+      <p:pic>
+        <p:nvPicPr>
+          <p:cNvPr id="16" name="Picture 15" descr="A screenshot of a cell phone&#10;&#10;Description automatically generated">
             <a:extLst>
               <a:ext uri="{FF2B5EF4-FFF2-40B4-BE49-F238E27FC236}">
-                <a16:creationId xmlns:a16="http://schemas.microsoft.com/office/drawing/2014/main" id="{198AC003-4B3C-9946-B23F-929D67E85998}"/>
-              </a:ext>
-            </a:extLst>
-          </p:cNvPr>
-          <p:cNvSpPr txBox="1"/>
-          <p:nvPr/>
-        </p:nvSpPr>
-        <p:spPr>
-          <a:xfrm>
-            <a:off x="5696897" y="5676047"/>
-            <a:ext cx="1093770" cy="923330"/>
-          </a:xfrm>
-          <a:prstGeom prst="rect">
-            <a:avLst/>
-          </a:prstGeom>
-          <a:noFill/>
-        </p:spPr>
-        <p:txBody>
-          <a:bodyPr wrap="square" rtlCol="0">
-            <a:spAutoFit/>
-          </a:bodyPr>
-          <a:lstStyle/>
-          <a:p>
-            <a:r>
-              <a:rPr lang="en-US" dirty="0"/>
-              <a:t>Diagnosis</a:t>
-            </a:r>
-          </a:p>
-          <a:p>
-            <a:endParaRPr lang="en-US" dirty="0"/>
-          </a:p>
-          <a:p>
-            <a:endParaRPr lang="en-US" dirty="0"/>
-          </a:p>
-        </p:txBody>
-      </p:sp>
-      <p:pic>
-        <p:nvPicPr>
-          <p:cNvPr id="11" name="Picture 10">
-            <a:extLst>
-              <a:ext uri="{FF2B5EF4-FFF2-40B4-BE49-F238E27FC236}">
-                <a16:creationId xmlns:a16="http://schemas.microsoft.com/office/drawing/2014/main" id="{2F88D2FD-3710-154E-B379-784F1BFD62DD}"/>
+                <a16:creationId xmlns:a16="http://schemas.microsoft.com/office/drawing/2014/main" id="{D8BCC73A-06A5-FB42-82E0-CE7D115CE7C7}"/>
               </a:ext>
             </a:extLst>
           </p:cNvPr>
@@ -6083,62 +6326,18 @@
         </p:blipFill>
         <p:spPr>
           <a:xfrm>
-            <a:off x="8583468" y="237012"/>
-            <a:ext cx="4846211" cy="6858000"/>
+            <a:off x="6171461" y="1909822"/>
+            <a:ext cx="5597779" cy="4103226"/>
           </a:xfrm>
           <a:prstGeom prst="rect">
             <a:avLst/>
           </a:prstGeom>
         </p:spPr>
       </p:pic>
-      <p:sp>
-        <p:nvSpPr>
-          <p:cNvPr id="12" name="TextBox 11">
-            <a:extLst>
-              <a:ext uri="{FF2B5EF4-FFF2-40B4-BE49-F238E27FC236}">
-                <a16:creationId xmlns:a16="http://schemas.microsoft.com/office/drawing/2014/main" id="{FB2EE277-C489-BF41-BEAF-05576D9A384F}"/>
-              </a:ext>
-            </a:extLst>
-          </p:cNvPr>
-          <p:cNvSpPr txBox="1"/>
-          <p:nvPr/>
-        </p:nvSpPr>
-        <p:spPr>
-          <a:xfrm>
-            <a:off x="9563006" y="6382036"/>
-            <a:ext cx="1953598" cy="1200329"/>
-          </a:xfrm>
-          <a:prstGeom prst="rect">
-            <a:avLst/>
-          </a:prstGeom>
-          <a:noFill/>
-        </p:spPr>
-        <p:txBody>
-          <a:bodyPr wrap="square" rtlCol="0">
-            <a:spAutoFit/>
-          </a:bodyPr>
-          <a:lstStyle/>
-          <a:p>
-            <a:r>
-              <a:rPr lang="en-US" dirty="0"/>
-              <a:t>Patient Prescribe</a:t>
-            </a:r>
-          </a:p>
-          <a:p>
-            <a:endParaRPr lang="en-US" dirty="0"/>
-          </a:p>
-          <a:p>
-            <a:endParaRPr lang="en-US" dirty="0"/>
-          </a:p>
-          <a:p>
-            <a:endParaRPr lang="en-US" dirty="0"/>
-          </a:p>
-        </p:txBody>
-      </p:sp>
     </p:spTree>
     <p:extLst>
       <p:ext uri="{BB962C8B-B14F-4D97-AF65-F5344CB8AC3E}">
-        <p14:creationId xmlns:p14="http://schemas.microsoft.com/office/powerpoint/2010/main" val="581362772"/>
+        <p14:creationId xmlns:p14="http://schemas.microsoft.com/office/powerpoint/2010/main" val="410666338"/>
       </p:ext>
     </p:extLst>
   </p:cSld>
@@ -6170,7 +6369,7 @@
           <p:cNvPr id="2" name="Title 1">
             <a:extLst>
               <a:ext uri="{FF2B5EF4-FFF2-40B4-BE49-F238E27FC236}">
-                <a16:creationId xmlns:a16="http://schemas.microsoft.com/office/drawing/2014/main" id="{AF22BCDE-958B-4E7D-8A92-7F4942518B66}"/>
+                <a16:creationId xmlns:a16="http://schemas.microsoft.com/office/drawing/2014/main" id="{5DF7E86D-0AD3-46CB-82C5-FB9D8FD4A927}"/>
               </a:ext>
             </a:extLst>
           </p:cNvPr>
@@ -6188,17 +6387,46 @@
           <a:p>
             <a:r>
               <a:rPr lang="en-US" dirty="0"/>
-              <a:t>User Interface</a:t>
+              <a:t>Use case: Order Tests</a:t>
             </a:r>
           </a:p>
         </p:txBody>
       </p:sp>
       <p:pic>
         <p:nvPicPr>
-          <p:cNvPr id="14" name="Picture 13" descr="A screenshot of a cell phone&#10;&#10;Description automatically generated">
+          <p:cNvPr id="5" name="Content Placeholder 4" descr="A screenshot of a cell phone&#10;&#10;Description automatically generated">
             <a:extLst>
               <a:ext uri="{FF2B5EF4-FFF2-40B4-BE49-F238E27FC236}">
-                <a16:creationId xmlns:a16="http://schemas.microsoft.com/office/drawing/2014/main" id="{F45D1B9C-CB9F-A444-BE8D-98A987C638B6}"/>
+                <a16:creationId xmlns:a16="http://schemas.microsoft.com/office/drawing/2014/main" id="{5A08F938-52FA-B943-ABDF-CC41F487BD6F}"/>
+              </a:ext>
+            </a:extLst>
+          </p:cNvPr>
+          <p:cNvPicPr>
+            <a:picLocks noGrp="1" noChangeAspect="1"/>
+          </p:cNvPicPr>
+          <p:nvPr>
+            <p:ph idx="1"/>
+          </p:nvPr>
+        </p:nvPicPr>
+        <p:blipFill>
+          <a:blip r:embed="rId3"/>
+          <a:stretch>
+            <a:fillRect/>
+          </a:stretch>
+        </p:blipFill>
+        <p:spPr>
+          <a:xfrm>
+            <a:off x="437246" y="1966269"/>
+            <a:ext cx="5252449" cy="4853856"/>
+          </a:xfrm>
+        </p:spPr>
+      </p:pic>
+      <p:pic>
+        <p:nvPicPr>
+          <p:cNvPr id="7" name="Picture 6" descr="A picture containing bird&#10;&#10;Description automatically generated">
+            <a:extLst>
+              <a:ext uri="{FF2B5EF4-FFF2-40B4-BE49-F238E27FC236}">
+                <a16:creationId xmlns:a16="http://schemas.microsoft.com/office/drawing/2014/main" id="{71AC11BE-95E0-1E49-B41F-59F1EF5FBB4D}"/>
               </a:ext>
             </a:extLst>
           </p:cNvPr>
@@ -6208,45 +6436,15 @@
           <p:nvPr/>
         </p:nvPicPr>
         <p:blipFill>
-          <a:blip r:embed="rId2"/>
+          <a:blip r:embed="rId4"/>
           <a:stretch>
             <a:fillRect/>
           </a:stretch>
         </p:blipFill>
         <p:spPr>
           <a:xfrm>
-            <a:off x="423481" y="1909822"/>
-            <a:ext cx="5634279" cy="4103225"/>
-          </a:xfrm>
-          <a:prstGeom prst="rect">
-            <a:avLst/>
-          </a:prstGeom>
-        </p:spPr>
-      </p:pic>
-      <p:pic>
-        <p:nvPicPr>
-          <p:cNvPr id="16" name="Picture 15" descr="A screenshot of a cell phone&#10;&#10;Description automatically generated">
-            <a:extLst>
-              <a:ext uri="{FF2B5EF4-FFF2-40B4-BE49-F238E27FC236}">
-                <a16:creationId xmlns:a16="http://schemas.microsoft.com/office/drawing/2014/main" id="{D8BCC73A-06A5-FB42-82E0-CE7D115CE7C7}"/>
-              </a:ext>
-            </a:extLst>
-          </p:cNvPr>
-          <p:cNvPicPr>
-            <a:picLocks noChangeAspect="1"/>
-          </p:cNvPicPr>
-          <p:nvPr/>
-        </p:nvPicPr>
-        <p:blipFill>
-          <a:blip r:embed="rId3"/>
-          <a:stretch>
-            <a:fillRect/>
-          </a:stretch>
-        </p:blipFill>
-        <p:spPr>
-          <a:xfrm>
-            <a:off x="6171461" y="1909822"/>
-            <a:ext cx="5597779" cy="4103226"/>
+            <a:off x="6886935" y="1966269"/>
+            <a:ext cx="4867819" cy="4480063"/>
           </a:xfrm>
           <a:prstGeom prst="rect">
             <a:avLst/>
@@ -6256,7 +6454,7 @@
     </p:spTree>
     <p:extLst>
       <p:ext uri="{BB962C8B-B14F-4D97-AF65-F5344CB8AC3E}">
-        <p14:creationId xmlns:p14="http://schemas.microsoft.com/office/powerpoint/2010/main" val="410666338"/>
+        <p14:creationId xmlns:p14="http://schemas.microsoft.com/office/powerpoint/2010/main" val="3021857814"/>
       </p:ext>
     </p:extLst>
   </p:cSld>
@@ -6288,7 +6486,7 @@
           <p:cNvPr id="2" name="Title 1">
             <a:extLst>
               <a:ext uri="{FF2B5EF4-FFF2-40B4-BE49-F238E27FC236}">
-                <a16:creationId xmlns:a16="http://schemas.microsoft.com/office/drawing/2014/main" id="{5DF7E86D-0AD3-46CB-82C5-FB9D8FD4A927}"/>
+                <a16:creationId xmlns:a16="http://schemas.microsoft.com/office/drawing/2014/main" id="{1BC4BAD3-4CD8-432E-A8B0-8648DED90A2E}"/>
               </a:ext>
             </a:extLst>
           </p:cNvPr>
@@ -6306,46 +6504,17 @@
           <a:p>
             <a:r>
               <a:rPr lang="en-US" dirty="0"/>
-              <a:t>Use case: Order Tests</a:t>
+              <a:t>Use Case: Exporting Data </a:t>
             </a:r>
           </a:p>
         </p:txBody>
       </p:sp>
       <p:pic>
         <p:nvPicPr>
-          <p:cNvPr id="5" name="Content Placeholder 4" descr="A screenshot of a cell phone&#10;&#10;Description automatically generated">
+          <p:cNvPr id="11" name="Picture 10" descr="A picture containing bird&#10;&#10;Description automatically generated">
             <a:extLst>
               <a:ext uri="{FF2B5EF4-FFF2-40B4-BE49-F238E27FC236}">
-                <a16:creationId xmlns:a16="http://schemas.microsoft.com/office/drawing/2014/main" id="{5A08F938-52FA-B943-ABDF-CC41F487BD6F}"/>
-              </a:ext>
-            </a:extLst>
-          </p:cNvPr>
-          <p:cNvPicPr>
-            <a:picLocks noGrp="1" noChangeAspect="1"/>
-          </p:cNvPicPr>
-          <p:nvPr>
-            <p:ph idx="1"/>
-          </p:nvPr>
-        </p:nvPicPr>
-        <p:blipFill>
-          <a:blip r:embed="rId2"/>
-          <a:stretch>
-            <a:fillRect/>
-          </a:stretch>
-        </p:blipFill>
-        <p:spPr>
-          <a:xfrm>
-            <a:off x="437246" y="1966269"/>
-            <a:ext cx="5252449" cy="4853856"/>
-          </a:xfrm>
-        </p:spPr>
-      </p:pic>
-      <p:pic>
-        <p:nvPicPr>
-          <p:cNvPr id="7" name="Picture 6" descr="A picture containing bird&#10;&#10;Description automatically generated">
-            <a:extLst>
-              <a:ext uri="{FF2B5EF4-FFF2-40B4-BE49-F238E27FC236}">
-                <a16:creationId xmlns:a16="http://schemas.microsoft.com/office/drawing/2014/main" id="{71AC11BE-95E0-1E49-B41F-59F1EF5FBB4D}"/>
+                <a16:creationId xmlns:a16="http://schemas.microsoft.com/office/drawing/2014/main" id="{95C0558A-66D6-7842-932C-79BBFC1677FA}"/>
               </a:ext>
             </a:extLst>
           </p:cNvPr>
@@ -6362,8 +6531,38 @@
         </p:blipFill>
         <p:spPr>
           <a:xfrm>
-            <a:off x="6886935" y="1966269"/>
-            <a:ext cx="4867819" cy="4480063"/>
+            <a:off x="6096000" y="1857817"/>
+            <a:ext cx="5646999" cy="4519668"/>
+          </a:xfrm>
+          <a:prstGeom prst="rect">
+            <a:avLst/>
+          </a:prstGeom>
+        </p:spPr>
+      </p:pic>
+      <p:pic>
+        <p:nvPicPr>
+          <p:cNvPr id="13" name="Picture 12" descr="A screenshot of text&#10;&#10;Description automatically generated">
+            <a:extLst>
+              <a:ext uri="{FF2B5EF4-FFF2-40B4-BE49-F238E27FC236}">
+                <a16:creationId xmlns:a16="http://schemas.microsoft.com/office/drawing/2014/main" id="{970F7E93-475E-414E-BA8F-D1A6997ED8E1}"/>
+              </a:ext>
+            </a:extLst>
+          </p:cNvPr>
+          <p:cNvPicPr>
+            <a:picLocks noChangeAspect="1"/>
+          </p:cNvPicPr>
+          <p:nvPr/>
+        </p:nvPicPr>
+        <p:blipFill>
+          <a:blip r:embed="rId4"/>
+          <a:stretch>
+            <a:fillRect/>
+          </a:stretch>
+        </p:blipFill>
+        <p:spPr>
+          <a:xfrm>
+            <a:off x="449001" y="1961509"/>
+            <a:ext cx="4822167" cy="4519669"/>
           </a:xfrm>
           <a:prstGeom prst="rect">
             <a:avLst/>
@@ -6373,7 +6572,7 @@
     </p:spTree>
     <p:extLst>
       <p:ext uri="{BB962C8B-B14F-4D97-AF65-F5344CB8AC3E}">
-        <p14:creationId xmlns:p14="http://schemas.microsoft.com/office/powerpoint/2010/main" val="3021857814"/>
+        <p14:creationId xmlns:p14="http://schemas.microsoft.com/office/powerpoint/2010/main" val="2207602372"/>
       </p:ext>
     </p:extLst>
   </p:cSld>
@@ -6405,124 +6604,6 @@
           <p:cNvPr id="2" name="Title 1">
             <a:extLst>
               <a:ext uri="{FF2B5EF4-FFF2-40B4-BE49-F238E27FC236}">
-                <a16:creationId xmlns:a16="http://schemas.microsoft.com/office/drawing/2014/main" id="{1BC4BAD3-4CD8-432E-A8B0-8648DED90A2E}"/>
-              </a:ext>
-            </a:extLst>
-          </p:cNvPr>
-          <p:cNvSpPr>
-            <a:spLocks noGrp="1"/>
-          </p:cNvSpPr>
-          <p:nvPr>
-            <p:ph type="title"/>
-          </p:nvPr>
-        </p:nvSpPr>
-        <p:spPr/>
-        <p:txBody>
-          <a:bodyPr/>
-          <a:lstStyle/>
-          <a:p>
-            <a:r>
-              <a:rPr lang="en-US" dirty="0"/>
-              <a:t>Use Case: Exporting Data </a:t>
-            </a:r>
-          </a:p>
-        </p:txBody>
-      </p:sp>
-      <p:pic>
-        <p:nvPicPr>
-          <p:cNvPr id="11" name="Picture 10" descr="A picture containing bird&#10;&#10;Description automatically generated">
-            <a:extLst>
-              <a:ext uri="{FF2B5EF4-FFF2-40B4-BE49-F238E27FC236}">
-                <a16:creationId xmlns:a16="http://schemas.microsoft.com/office/drawing/2014/main" id="{95C0558A-66D6-7842-932C-79BBFC1677FA}"/>
-              </a:ext>
-            </a:extLst>
-          </p:cNvPr>
-          <p:cNvPicPr>
-            <a:picLocks noChangeAspect="1"/>
-          </p:cNvPicPr>
-          <p:nvPr/>
-        </p:nvPicPr>
-        <p:blipFill>
-          <a:blip r:embed="rId2"/>
-          <a:stretch>
-            <a:fillRect/>
-          </a:stretch>
-        </p:blipFill>
-        <p:spPr>
-          <a:xfrm>
-            <a:off x="6096000" y="1857817"/>
-            <a:ext cx="5646999" cy="4519668"/>
-          </a:xfrm>
-          <a:prstGeom prst="rect">
-            <a:avLst/>
-          </a:prstGeom>
-        </p:spPr>
-      </p:pic>
-      <p:pic>
-        <p:nvPicPr>
-          <p:cNvPr id="13" name="Picture 12" descr="A screenshot of text&#10;&#10;Description automatically generated">
-            <a:extLst>
-              <a:ext uri="{FF2B5EF4-FFF2-40B4-BE49-F238E27FC236}">
-                <a16:creationId xmlns:a16="http://schemas.microsoft.com/office/drawing/2014/main" id="{970F7E93-475E-414E-BA8F-D1A6997ED8E1}"/>
-              </a:ext>
-            </a:extLst>
-          </p:cNvPr>
-          <p:cNvPicPr>
-            <a:picLocks noChangeAspect="1"/>
-          </p:cNvPicPr>
-          <p:nvPr/>
-        </p:nvPicPr>
-        <p:blipFill>
-          <a:blip r:embed="rId3"/>
-          <a:stretch>
-            <a:fillRect/>
-          </a:stretch>
-        </p:blipFill>
-        <p:spPr>
-          <a:xfrm>
-            <a:off x="449001" y="1961509"/>
-            <a:ext cx="4822167" cy="4519669"/>
-          </a:xfrm>
-          <a:prstGeom prst="rect">
-            <a:avLst/>
-          </a:prstGeom>
-        </p:spPr>
-      </p:pic>
-    </p:spTree>
-    <p:extLst>
-      <p:ext uri="{BB962C8B-B14F-4D97-AF65-F5344CB8AC3E}">
-        <p14:creationId xmlns:p14="http://schemas.microsoft.com/office/powerpoint/2010/main" val="2207602372"/>
-      </p:ext>
-    </p:extLst>
-  </p:cSld>
-  <p:clrMapOvr>
-    <a:masterClrMapping/>
-  </p:clrMapOvr>
-</p:sld>
-</file>
-
-<file path=ppt/slides/slide9.xml><?xml version="1.0" encoding="utf-8"?>
-<p:sld xmlns:a="http://schemas.openxmlformats.org/drawingml/2006/main" xmlns:r="http://schemas.openxmlformats.org/officeDocument/2006/relationships" xmlns:p="http://schemas.openxmlformats.org/presentationml/2006/main">
-  <p:cSld>
-    <p:spTree>
-      <p:nvGrpSpPr>
-        <p:cNvPr id="1" name=""/>
-        <p:cNvGrpSpPr/>
-        <p:nvPr/>
-      </p:nvGrpSpPr>
-      <p:grpSpPr>
-        <a:xfrm>
-          <a:off x="0" y="0"/>
-          <a:ext cx="0" cy="0"/>
-          <a:chOff x="0" y="0"/>
-          <a:chExt cx="0" cy="0"/>
-        </a:xfrm>
-      </p:grpSpPr>
-      <p:sp>
-        <p:nvSpPr>
-          <p:cNvPr id="2" name="Title 1">
-            <a:extLst>
-              <a:ext uri="{FF2B5EF4-FFF2-40B4-BE49-F238E27FC236}">
                 <a16:creationId xmlns:a16="http://schemas.microsoft.com/office/drawing/2014/main" id="{F95089F1-3BBC-4B0D-B776-FE5D69F7C76F}"/>
               </a:ext>
             </a:extLst>
@@ -6563,7 +6644,7 @@
           </p:nvPr>
         </p:nvPicPr>
         <p:blipFill>
-          <a:blip r:embed="rId2"/>
+          <a:blip r:embed="rId3"/>
           <a:stretch>
             <a:fillRect/>
           </a:stretch>
@@ -6590,6 +6671,633 @@
           <p:nvPr/>
         </p:nvPicPr>
         <p:blipFill>
+          <a:blip r:embed="rId4"/>
+          <a:stretch>
+            <a:fillRect/>
+          </a:stretch>
+        </p:blipFill>
+        <p:spPr>
+          <a:xfrm>
+            <a:off x="5833642" y="1970465"/>
+            <a:ext cx="5898022" cy="4594592"/>
+          </a:xfrm>
+          <a:prstGeom prst="rect">
+            <a:avLst/>
+          </a:prstGeom>
+        </p:spPr>
+      </p:pic>
+    </p:spTree>
+    <p:extLst>
+      <p:ext uri="{BB962C8B-B14F-4D97-AF65-F5344CB8AC3E}">
+        <p14:creationId xmlns:p14="http://schemas.microsoft.com/office/powerpoint/2010/main" val="633009331"/>
+      </p:ext>
+    </p:extLst>
+  </p:cSld>
+  <p:clrMapOvr>
+    <a:masterClrMapping/>
+  </p:clrMapOvr>
+</p:sld>
+</file>
+
+<file path=ppt/slides/slide9.xml><?xml version="1.0" encoding="utf-8"?>
+<p:sld xmlns:a="http://schemas.openxmlformats.org/drawingml/2006/main" xmlns:r="http://schemas.openxmlformats.org/officeDocument/2006/relationships" xmlns:p="http://schemas.openxmlformats.org/presentationml/2006/main">
+  <p:cSld>
+    <p:bg>
+      <p:bgPr>
+        <a:solidFill>
+          <a:schemeClr val="bg1"/>
+        </a:solidFill>
+        <a:effectLst/>
+      </p:bgPr>
+    </p:bg>
+    <p:spTree>
+      <p:nvGrpSpPr>
+        <p:cNvPr id="1" name=""/>
+        <p:cNvGrpSpPr/>
+        <p:nvPr/>
+      </p:nvGrpSpPr>
+      <p:grpSpPr>
+        <a:xfrm>
+          <a:off x="0" y="0"/>
+          <a:ext cx="0" cy="0"/>
+          <a:chOff x="0" y="0"/>
+          <a:chExt cx="0" cy="0"/>
+        </a:xfrm>
+      </p:grpSpPr>
+      <p:sp>
+        <p:nvSpPr>
+          <p:cNvPr id="10" name="Rectangle 9">
+            <a:extLst>
+              <a:ext uri="{FF2B5EF4-FFF2-40B4-BE49-F238E27FC236}">
+                <a16:creationId xmlns:a16="http://schemas.microsoft.com/office/drawing/2014/main" id="{A078A52F-85EA-4C0B-962B-D9D9DD4DD78C}"/>
+              </a:ext>
+              <a:ext uri="{C183D7F6-B498-43B3-948B-1728B52AA6E4}">
+                <adec:decorative xmlns:adec="http://schemas.microsoft.com/office/drawing/2017/decorative" val="1"/>
+              </a:ext>
+            </a:extLst>
+          </p:cNvPr>
+          <p:cNvSpPr>
+            <a:spLocks noGrp="1" noRot="1" noChangeAspect="1" noMove="1" noResize="1" noEditPoints="1" noAdjustHandles="1" noChangeArrowheads="1" noChangeShapeType="1" noTextEdit="1"/>
+          </p:cNvSpPr>
+          <p:nvPr>
+            <p:extLst>
+              <p:ext uri="{386F3935-93C4-4BCD-93E2-E3B085C9AB24}">
+                <p16:designElem xmlns:p16="http://schemas.microsoft.com/office/powerpoint/2015/main" val="1"/>
+              </p:ext>
+            </p:extLst>
+          </p:nvPr>
+        </p:nvSpPr>
+        <p:spPr>
+          <a:xfrm>
+            <a:off x="446534" y="457200"/>
+            <a:ext cx="3703320" cy="94997"/>
+          </a:xfrm>
+          <a:prstGeom prst="rect">
+            <a:avLst/>
+          </a:prstGeom>
+          <a:solidFill>
+            <a:schemeClr val="accent1"/>
+          </a:solidFill>
+          <a:ln>
+            <a:noFill/>
+          </a:ln>
+          <a:effectLst/>
+        </p:spPr>
+        <p:style>
+          <a:lnRef idx="1">
+            <a:schemeClr val="accent1"/>
+          </a:lnRef>
+          <a:fillRef idx="3">
+            <a:schemeClr val="accent1"/>
+          </a:fillRef>
+          <a:effectRef idx="2">
+            <a:schemeClr val="accent1"/>
+          </a:effectRef>
+          <a:fontRef idx="minor">
+            <a:schemeClr val="lt1"/>
+          </a:fontRef>
+        </p:style>
+      </p:sp>
+      <p:sp>
+        <p:nvSpPr>
+          <p:cNvPr id="12" name="Rectangle 11">
+            <a:extLst>
+              <a:ext uri="{FF2B5EF4-FFF2-40B4-BE49-F238E27FC236}">
+                <a16:creationId xmlns:a16="http://schemas.microsoft.com/office/drawing/2014/main" id="{919797D5-5700-4683-B30A-5B4D56CB8270}"/>
+              </a:ext>
+              <a:ext uri="{C183D7F6-B498-43B3-948B-1728B52AA6E4}">
+                <adec:decorative xmlns:adec="http://schemas.microsoft.com/office/drawing/2017/decorative" val="1"/>
+              </a:ext>
+            </a:extLst>
+          </p:cNvPr>
+          <p:cNvSpPr>
+            <a:spLocks noGrp="1" noRot="1" noChangeAspect="1" noMove="1" noResize="1" noEditPoints="1" noAdjustHandles="1" noChangeArrowheads="1" noChangeShapeType="1" noTextEdit="1"/>
+          </p:cNvSpPr>
+          <p:nvPr>
+            <p:extLst>
+              <p:ext uri="{386F3935-93C4-4BCD-93E2-E3B085C9AB24}">
+                <p16:designElem xmlns:p16="http://schemas.microsoft.com/office/powerpoint/2015/main" val="1"/>
+              </p:ext>
+            </p:extLst>
+          </p:nvPr>
+        </p:nvSpPr>
+        <p:spPr>
+          <a:xfrm>
+            <a:off x="8042147" y="453643"/>
+            <a:ext cx="3703320" cy="98554"/>
+          </a:xfrm>
+          <a:prstGeom prst="rect">
+            <a:avLst/>
+          </a:prstGeom>
+          <a:solidFill>
+            <a:schemeClr val="accent4"/>
+          </a:solidFill>
+          <a:ln>
+            <a:noFill/>
+          </a:ln>
+          <a:effectLst/>
+        </p:spPr>
+        <p:style>
+          <a:lnRef idx="1">
+            <a:schemeClr val="accent1"/>
+          </a:lnRef>
+          <a:fillRef idx="3">
+            <a:schemeClr val="accent1"/>
+          </a:fillRef>
+          <a:effectRef idx="2">
+            <a:schemeClr val="accent1"/>
+          </a:effectRef>
+          <a:fontRef idx="minor">
+            <a:schemeClr val="lt1"/>
+          </a:fontRef>
+        </p:style>
+      </p:sp>
+      <p:sp>
+        <p:nvSpPr>
+          <p:cNvPr id="14" name="Rectangle 13">
+            <a:extLst>
+              <a:ext uri="{FF2B5EF4-FFF2-40B4-BE49-F238E27FC236}">
+                <a16:creationId xmlns:a16="http://schemas.microsoft.com/office/drawing/2014/main" id="{4856A7B9-9801-42EC-A4C9-7E22A56EF53D}"/>
+              </a:ext>
+              <a:ext uri="{C183D7F6-B498-43B3-948B-1728B52AA6E4}">
+                <adec:decorative xmlns:adec="http://schemas.microsoft.com/office/drawing/2017/decorative" val="1"/>
+              </a:ext>
+            </a:extLst>
+          </p:cNvPr>
+          <p:cNvSpPr>
+            <a:spLocks noGrp="1" noRot="1" noChangeAspect="1" noMove="1" noResize="1" noEditPoints="1" noAdjustHandles="1" noChangeArrowheads="1" noChangeShapeType="1" noTextEdit="1"/>
+          </p:cNvSpPr>
+          <p:nvPr>
+            <p:extLst>
+              <p:ext uri="{386F3935-93C4-4BCD-93E2-E3B085C9AB24}">
+                <p16:designElem xmlns:p16="http://schemas.microsoft.com/office/powerpoint/2015/main" val="1"/>
+              </p:ext>
+            </p:extLst>
+          </p:nvPr>
+        </p:nvSpPr>
+        <p:spPr>
+          <a:xfrm>
+            <a:off x="4241830" y="457200"/>
+            <a:ext cx="3703320" cy="91440"/>
+          </a:xfrm>
+          <a:prstGeom prst="rect">
+            <a:avLst/>
+          </a:prstGeom>
+          <a:solidFill>
+            <a:schemeClr val="accent2"/>
+          </a:solidFill>
+          <a:ln>
+            <a:noFill/>
+          </a:ln>
+          <a:effectLst/>
+        </p:spPr>
+        <p:style>
+          <a:lnRef idx="1">
+            <a:schemeClr val="accent1"/>
+          </a:lnRef>
+          <a:fillRef idx="3">
+            <a:schemeClr val="accent1"/>
+          </a:fillRef>
+          <a:effectRef idx="2">
+            <a:schemeClr val="accent1"/>
+          </a:effectRef>
+          <a:fontRef idx="minor">
+            <a:schemeClr val="lt1"/>
+          </a:fontRef>
+        </p:style>
+      </p:sp>
+      <p:sp>
+        <p:nvSpPr>
+          <p:cNvPr id="16" name="Rectangle 15">
+            <a:extLst>
+              <a:ext uri="{FF2B5EF4-FFF2-40B4-BE49-F238E27FC236}">
+                <a16:creationId xmlns:a16="http://schemas.microsoft.com/office/drawing/2014/main" id="{8AD54DB8-C150-4290-85D6-F5B0262BFEEF}"/>
+              </a:ext>
+              <a:ext uri="{C183D7F6-B498-43B3-948B-1728B52AA6E4}">
+                <adec:decorative xmlns:adec="http://schemas.microsoft.com/office/drawing/2017/decorative" val="1"/>
+              </a:ext>
+            </a:extLst>
+          </p:cNvPr>
+          <p:cNvSpPr>
+            <a:spLocks noGrp="1" noRot="1" noChangeAspect="1" noMove="1" noResize="1" noEditPoints="1" noAdjustHandles="1" noChangeArrowheads="1" noChangeShapeType="1" noTextEdit="1"/>
+          </p:cNvSpPr>
+          <p:nvPr>
+            <p:extLst>
+              <p:ext uri="{386F3935-93C4-4BCD-93E2-E3B085C9AB24}">
+                <p16:designElem xmlns:p16="http://schemas.microsoft.com/office/powerpoint/2015/main" val="1"/>
+              </p:ext>
+            </p:extLst>
+          </p:nvPr>
+        </p:nvSpPr>
+        <p:spPr>
+          <a:xfrm>
+            <a:off x="446534" y="3085765"/>
+            <a:ext cx="11262866" cy="3304800"/>
+          </a:xfrm>
+          <a:prstGeom prst="rect">
+            <a:avLst/>
+          </a:prstGeom>
+          <a:solidFill>
+            <a:schemeClr val="accent1"/>
+          </a:solidFill>
+          <a:ln>
+            <a:noFill/>
+          </a:ln>
+          <a:effectLst/>
+        </p:spPr>
+        <p:style>
+          <a:lnRef idx="1">
+            <a:schemeClr val="accent1"/>
+          </a:lnRef>
+          <a:fillRef idx="3">
+            <a:schemeClr val="accent1"/>
+          </a:fillRef>
+          <a:effectRef idx="2">
+            <a:schemeClr val="accent1"/>
+          </a:effectRef>
+          <a:fontRef idx="minor">
+            <a:schemeClr val="lt1"/>
+          </a:fontRef>
+        </p:style>
+      </p:sp>
+      <p:sp useBgFill="1">
+        <p:nvSpPr>
+          <p:cNvPr id="18" name="Rectangle 17">
+            <a:extLst>
+              <a:ext uri="{FF2B5EF4-FFF2-40B4-BE49-F238E27FC236}">
+                <a16:creationId xmlns:a16="http://schemas.microsoft.com/office/drawing/2014/main" id="{379F11E2-8BA5-4C5C-AE7C-361E5EA011FF}"/>
+              </a:ext>
+              <a:ext uri="{C183D7F6-B498-43B3-948B-1728B52AA6E4}">
+                <adec:decorative xmlns:adec="http://schemas.microsoft.com/office/drawing/2017/decorative" val="1"/>
+              </a:ext>
+            </a:extLst>
+          </p:cNvPr>
+          <p:cNvSpPr>
+            <a:spLocks noGrp="1" noRot="1" noChangeAspect="1" noMove="1" noResize="1" noEditPoints="1" noAdjustHandles="1" noChangeArrowheads="1" noChangeShapeType="1" noTextEdit="1"/>
+          </p:cNvSpPr>
+          <p:nvPr>
+            <p:extLst>
+              <p:ext uri="{386F3935-93C4-4BCD-93E2-E3B085C9AB24}">
+                <p16:designElem xmlns:p16="http://schemas.microsoft.com/office/powerpoint/2015/main" val="1"/>
+              </p:ext>
+            </p:extLst>
+          </p:nvPr>
+        </p:nvSpPr>
+        <p:spPr>
+          <a:xfrm>
+            <a:off x="0" y="1"/>
+            <a:ext cx="12191999" cy="6858000"/>
+          </a:xfrm>
+          <a:prstGeom prst="rect">
+            <a:avLst/>
+          </a:prstGeom>
+          <a:ln>
+            <a:noFill/>
+          </a:ln>
+        </p:spPr>
+        <p:style>
+          <a:lnRef idx="2">
+            <a:schemeClr val="accent1">
+              <a:shade val="50000"/>
+            </a:schemeClr>
+          </a:lnRef>
+          <a:fillRef idx="1">
+            <a:schemeClr val="accent1"/>
+          </a:fillRef>
+          <a:effectRef idx="0">
+            <a:schemeClr val="accent1"/>
+          </a:effectRef>
+          <a:fontRef idx="minor">
+            <a:schemeClr val="lt1"/>
+          </a:fontRef>
+        </p:style>
+        <p:txBody>
+          <a:bodyPr rtlCol="0" anchor="ctr"/>
+          <a:lstStyle/>
+          <a:p>
+            <a:pPr algn="ctr"/>
+            <a:endParaRPr lang="en-US"/>
+          </a:p>
+        </p:txBody>
+      </p:sp>
+      <p:sp>
+        <p:nvSpPr>
+          <p:cNvPr id="20" name="Rectangle 19">
+            <a:extLst>
+              <a:ext uri="{FF2B5EF4-FFF2-40B4-BE49-F238E27FC236}">
+                <a16:creationId xmlns:a16="http://schemas.microsoft.com/office/drawing/2014/main" id="{7C00E1DA-EC7C-40FC-95E3-11FDCD2E4291}"/>
+              </a:ext>
+              <a:ext uri="{C183D7F6-B498-43B3-948B-1728B52AA6E4}">
+                <adec:decorative xmlns:adec="http://schemas.microsoft.com/office/drawing/2017/decorative" val="1"/>
+              </a:ext>
+            </a:extLst>
+          </p:cNvPr>
+          <p:cNvSpPr>
+            <a:spLocks noGrp="1" noRot="1" noChangeAspect="1" noMove="1" noResize="1" noEditPoints="1" noAdjustHandles="1" noChangeArrowheads="1" noChangeShapeType="1" noTextEdit="1"/>
+          </p:cNvSpPr>
+          <p:nvPr>
+            <p:extLst>
+              <p:ext uri="{386F3935-93C4-4BCD-93E2-E3B085C9AB24}">
+                <p16:designElem xmlns:p16="http://schemas.microsoft.com/office/powerpoint/2015/main" val="1"/>
+              </p:ext>
+            </p:extLst>
+          </p:nvPr>
+        </p:nvSpPr>
+        <p:spPr>
+          <a:xfrm>
+            <a:off x="8042147" y="723899"/>
+            <a:ext cx="3703320" cy="5666666"/>
+          </a:xfrm>
+          <a:prstGeom prst="rect">
+            <a:avLst/>
+          </a:prstGeom>
+          <a:solidFill>
+            <a:schemeClr val="accent1"/>
+          </a:solidFill>
+          <a:ln>
+            <a:noFill/>
+          </a:ln>
+          <a:effectLst/>
+        </p:spPr>
+        <p:style>
+          <a:lnRef idx="1">
+            <a:schemeClr val="accent1"/>
+          </a:lnRef>
+          <a:fillRef idx="3">
+            <a:schemeClr val="accent1"/>
+          </a:fillRef>
+          <a:effectRef idx="2">
+            <a:schemeClr val="accent1"/>
+          </a:effectRef>
+          <a:fontRef idx="minor">
+            <a:schemeClr val="lt1"/>
+          </a:fontRef>
+        </p:style>
+      </p:sp>
+      <p:sp>
+        <p:nvSpPr>
+          <p:cNvPr id="2" name="Title 1">
+            <a:extLst>
+              <a:ext uri="{FF2B5EF4-FFF2-40B4-BE49-F238E27FC236}">
+                <a16:creationId xmlns:a16="http://schemas.microsoft.com/office/drawing/2014/main" id="{22985F90-DE37-AA4B-AC91-BB99F131D941}"/>
+              </a:ext>
+            </a:extLst>
+          </p:cNvPr>
+          <p:cNvSpPr>
+            <a:spLocks noGrp="1"/>
+          </p:cNvSpPr>
+          <p:nvPr>
+            <p:ph type="title"/>
+          </p:nvPr>
+        </p:nvSpPr>
+        <p:spPr>
+          <a:xfrm>
+            <a:off x="8296275" y="1419225"/>
+            <a:ext cx="3081576" cy="2085869"/>
+          </a:xfrm>
+        </p:spPr>
+        <p:txBody>
+          <a:bodyPr vert="horz" lIns="91440" tIns="45720" rIns="91440" bIns="45720" rtlCol="0" anchor="b">
+            <a:normAutofit/>
+          </a:bodyPr>
+          <a:lstStyle/>
+          <a:p>
+            <a:r>
+              <a:rPr lang="en-US" sz="3200" dirty="0">
+                <a:solidFill>
+                  <a:srgbClr val="FFFFFF"/>
+                </a:solidFill>
+              </a:rPr>
+              <a:t>Traceability Matrix </a:t>
+            </a:r>
+          </a:p>
+        </p:txBody>
+      </p:sp>
+      <p:grpSp>
+        <p:nvGrpSpPr>
+          <p:cNvPr id="22" name="Group 21">
+            <a:extLst>
+              <a:ext uri="{FF2B5EF4-FFF2-40B4-BE49-F238E27FC236}">
+                <a16:creationId xmlns:a16="http://schemas.microsoft.com/office/drawing/2014/main" id="{9A421166-2996-41A7-B094-AE5316F347DD}"/>
+              </a:ext>
+              <a:ext uri="{C183D7F6-B498-43B3-948B-1728B52AA6E4}">
+                <adec:decorative xmlns:adec="http://schemas.microsoft.com/office/drawing/2017/decorative" val="1"/>
+              </a:ext>
+            </a:extLst>
+          </p:cNvPr>
+          <p:cNvGrpSpPr>
+            <a:grpSpLocks noGrp="1" noUngrp="1" noRot="1" noChangeAspect="1" noMove="1" noResize="1"/>
+          </p:cNvGrpSpPr>
+          <p:nvPr>
+            <p:extLst>
+              <p:ext uri="{386F3935-93C4-4BCD-93E2-E3B085C9AB24}">
+                <p16:designElem xmlns:p16="http://schemas.microsoft.com/office/powerpoint/2015/main" val="1"/>
+              </p:ext>
+            </p:extLst>
+          </p:nvPr>
+        </p:nvGrpSpPr>
+        <p:grpSpPr>
+          <a:xfrm>
+            <a:off x="446534" y="453643"/>
+            <a:ext cx="11298933" cy="98554"/>
+            <a:chOff x="446534" y="453643"/>
+            <a:chExt cx="11298933" cy="98554"/>
+          </a:xfrm>
+        </p:grpSpPr>
+        <p:sp>
+          <p:nvSpPr>
+            <p:cNvPr id="23" name="Rectangle 22">
+              <a:extLst>
+                <a:ext uri="{FF2B5EF4-FFF2-40B4-BE49-F238E27FC236}">
+                  <a16:creationId xmlns:a16="http://schemas.microsoft.com/office/drawing/2014/main" id="{FDBB1B92-A3EB-43E4-8FAB-D20E8ED14CEF}"/>
+                </a:ext>
+                <a:ext uri="{C183D7F6-B498-43B3-948B-1728B52AA6E4}">
+                  <adec:decorative xmlns:adec="http://schemas.microsoft.com/office/drawing/2017/decorative" val="1"/>
+                </a:ext>
+              </a:extLst>
+            </p:cNvPr>
+            <p:cNvSpPr/>
+            <p:nvPr>
+              <p:extLst>
+                <p:ext uri="{386F3935-93C4-4BCD-93E2-E3B085C9AB24}">
+                  <p16:designElem xmlns:p16="http://schemas.microsoft.com/office/powerpoint/2015/main" val="1"/>
+                </p:ext>
+              </p:extLst>
+            </p:nvPr>
+          </p:nvSpPr>
+          <p:spPr>
+            <a:xfrm>
+              <a:off x="446534" y="457200"/>
+              <a:ext cx="3703320" cy="94997"/>
+            </a:xfrm>
+            <a:prstGeom prst="rect">
+              <a:avLst/>
+            </a:prstGeom>
+            <a:solidFill>
+              <a:schemeClr val="accent1"/>
+            </a:solidFill>
+            <a:ln>
+              <a:noFill/>
+            </a:ln>
+            <a:effectLst/>
+          </p:spPr>
+          <p:style>
+            <a:lnRef idx="1">
+              <a:schemeClr val="accent1"/>
+            </a:lnRef>
+            <a:fillRef idx="3">
+              <a:schemeClr val="accent1"/>
+            </a:fillRef>
+            <a:effectRef idx="2">
+              <a:schemeClr val="accent1"/>
+            </a:effectRef>
+            <a:fontRef idx="minor">
+              <a:schemeClr val="lt1"/>
+            </a:fontRef>
+          </p:style>
+        </p:sp>
+        <p:sp>
+          <p:nvSpPr>
+            <p:cNvPr id="24" name="Rectangle 23">
+              <a:extLst>
+                <a:ext uri="{FF2B5EF4-FFF2-40B4-BE49-F238E27FC236}">
+                  <a16:creationId xmlns:a16="http://schemas.microsoft.com/office/drawing/2014/main" id="{3F3972F4-FE7E-48EA-AAD8-9BE5750A6672}"/>
+                </a:ext>
+                <a:ext uri="{C183D7F6-B498-43B3-948B-1728B52AA6E4}">
+                  <adec:decorative xmlns:adec="http://schemas.microsoft.com/office/drawing/2017/decorative" val="1"/>
+                </a:ext>
+              </a:extLst>
+            </p:cNvPr>
+            <p:cNvSpPr/>
+            <p:nvPr>
+              <p:extLst>
+                <p:ext uri="{386F3935-93C4-4BCD-93E2-E3B085C9AB24}">
+                  <p16:designElem xmlns:p16="http://schemas.microsoft.com/office/powerpoint/2015/main" val="1"/>
+                </p:ext>
+              </p:extLst>
+            </p:nvPr>
+          </p:nvSpPr>
+          <p:spPr>
+            <a:xfrm>
+              <a:off x="8042147" y="453643"/>
+              <a:ext cx="3703320" cy="98554"/>
+            </a:xfrm>
+            <a:prstGeom prst="rect">
+              <a:avLst/>
+            </a:prstGeom>
+            <a:solidFill>
+              <a:schemeClr val="accent4"/>
+            </a:solidFill>
+            <a:ln>
+              <a:noFill/>
+            </a:ln>
+            <a:effectLst/>
+          </p:spPr>
+          <p:style>
+            <a:lnRef idx="1">
+              <a:schemeClr val="accent1"/>
+            </a:lnRef>
+            <a:fillRef idx="3">
+              <a:schemeClr val="accent1"/>
+            </a:fillRef>
+            <a:effectRef idx="2">
+              <a:schemeClr val="accent1"/>
+            </a:effectRef>
+            <a:fontRef idx="minor">
+              <a:schemeClr val="lt1"/>
+            </a:fontRef>
+          </p:style>
+        </p:sp>
+        <p:sp>
+          <p:nvSpPr>
+            <p:cNvPr id="25" name="Rectangle 24">
+              <a:extLst>
+                <a:ext uri="{FF2B5EF4-FFF2-40B4-BE49-F238E27FC236}">
+                  <a16:creationId xmlns:a16="http://schemas.microsoft.com/office/drawing/2014/main" id="{221614E5-870B-4D5E-A43B-8FF7E5323484}"/>
+                </a:ext>
+                <a:ext uri="{C183D7F6-B498-43B3-948B-1728B52AA6E4}">
+                  <adec:decorative xmlns:adec="http://schemas.microsoft.com/office/drawing/2017/decorative" val="1"/>
+                </a:ext>
+              </a:extLst>
+            </p:cNvPr>
+            <p:cNvSpPr/>
+            <p:nvPr>
+              <p:extLst>
+                <p:ext uri="{386F3935-93C4-4BCD-93E2-E3B085C9AB24}">
+                  <p16:designElem xmlns:p16="http://schemas.microsoft.com/office/powerpoint/2015/main" val="1"/>
+                </p:ext>
+              </p:extLst>
+            </p:nvPr>
+          </p:nvSpPr>
+          <p:spPr>
+            <a:xfrm>
+              <a:off x="4241830" y="457200"/>
+              <a:ext cx="3703320" cy="91440"/>
+            </a:xfrm>
+            <a:prstGeom prst="rect">
+              <a:avLst/>
+            </a:prstGeom>
+            <a:solidFill>
+              <a:schemeClr val="accent2"/>
+            </a:solidFill>
+            <a:ln>
+              <a:noFill/>
+            </a:ln>
+            <a:effectLst/>
+          </p:spPr>
+          <p:style>
+            <a:lnRef idx="1">
+              <a:schemeClr val="accent1"/>
+            </a:lnRef>
+            <a:fillRef idx="3">
+              <a:schemeClr val="accent1"/>
+            </a:fillRef>
+            <a:effectRef idx="2">
+              <a:schemeClr val="accent1"/>
+            </a:effectRef>
+            <a:fontRef idx="minor">
+              <a:schemeClr val="lt1"/>
+            </a:fontRef>
+          </p:style>
+        </p:sp>
+      </p:grpSp>
+      <p:pic>
+        <p:nvPicPr>
+          <p:cNvPr id="9" name="Content Placeholder 8" descr="A close up of text on a white background&#10;&#10;Description automatically generated">
+            <a:extLst>
+              <a:ext uri="{FF2B5EF4-FFF2-40B4-BE49-F238E27FC236}">
+                <a16:creationId xmlns:a16="http://schemas.microsoft.com/office/drawing/2014/main" id="{5202F20A-FADA-2749-AFC1-F489DCC35A44}"/>
+              </a:ext>
+            </a:extLst>
+          </p:cNvPr>
+          <p:cNvPicPr>
+            <a:picLocks noGrp="1" noChangeAspect="1"/>
+          </p:cNvPicPr>
+          <p:nvPr>
+            <p:ph idx="1"/>
+          </p:nvPr>
+        </p:nvPicPr>
+        <p:blipFill>
           <a:blip r:embed="rId3"/>
           <a:stretch>
             <a:fillRect/>
@@ -6597,18 +7305,15 @@
         </p:blipFill>
         <p:spPr>
           <a:xfrm>
-            <a:off x="5833642" y="1970465"/>
-            <a:ext cx="5898022" cy="4594592"/>
-          </a:xfrm>
-          <a:prstGeom prst="rect">
-            <a:avLst/>
-          </a:prstGeom>
+            <a:off x="482600" y="592336"/>
+            <a:ext cx="5613400" cy="6265663"/>
+          </a:xfrm>
         </p:spPr>
       </p:pic>
     </p:spTree>
     <p:extLst>
       <p:ext uri="{BB962C8B-B14F-4D97-AF65-F5344CB8AC3E}">
-        <p14:creationId xmlns:p14="http://schemas.microsoft.com/office/powerpoint/2010/main" val="633009331"/>
+        <p14:creationId xmlns:p14="http://schemas.microsoft.com/office/powerpoint/2010/main" val="4059952136"/>
       </p:ext>
     </p:extLst>
   </p:cSld>

</xml_diff>